<commit_message>
2 prednaska a cviko, finalne verzie pred prednaskou
</commit_message>
<xml_diff>
--- a/02-cvicenie/02-cvicenie.pptx
+++ b/02-cvicenie/02-cvicenie.pptx
@@ -14,8 +14,9 @@
     <p:sldId id="258" r:id="rId8"/>
     <p:sldId id="264" r:id="rId9"/>
     <p:sldId id="265" r:id="rId10"/>
-    <p:sldId id="266" r:id="rId11"/>
-    <p:sldId id="260" r:id="rId12"/>
+    <p:sldId id="268" r:id="rId11"/>
+    <p:sldId id="266" r:id="rId12"/>
+    <p:sldId id="260" r:id="rId13"/>
   </p:sldIdLst>
   <p:sldSz cx="12192000" cy="6858000"/>
   <p:notesSz cx="6858000" cy="9144000"/>
@@ -144,7 +145,7 @@
           <p:cNvPr id="2" name="Title 1">
             <a:extLst>
               <a:ext uri="{FF2B5EF4-FFF2-40B4-BE49-F238E27FC236}">
-                <a16:creationId xmlns:a16="http://schemas.microsoft.com/office/drawing/2014/main" xmlns="" id="{D2BE5044-97CB-9044-9B8B-2D86E082E5EC}"/>
+                <a16:creationId xmlns:a16="http://schemas.microsoft.com/office/drawing/2014/main" id="{D2BE5044-97CB-9044-9B8B-2D86E082E5EC}"/>
               </a:ext>
             </a:extLst>
           </p:cNvPr>
@@ -182,7 +183,7 @@
           <p:cNvPr id="3" name="Subtitle 2">
             <a:extLst>
               <a:ext uri="{FF2B5EF4-FFF2-40B4-BE49-F238E27FC236}">
-                <a16:creationId xmlns:a16="http://schemas.microsoft.com/office/drawing/2014/main" xmlns="" id="{0D7614D8-0353-6144-A868-99963246CA3F}"/>
+                <a16:creationId xmlns:a16="http://schemas.microsoft.com/office/drawing/2014/main" id="{0D7614D8-0353-6144-A868-99963246CA3F}"/>
               </a:ext>
             </a:extLst>
           </p:cNvPr>
@@ -253,7 +254,7 @@
           <p:cNvPr id="4" name="Date Placeholder 3">
             <a:extLst>
               <a:ext uri="{FF2B5EF4-FFF2-40B4-BE49-F238E27FC236}">
-                <a16:creationId xmlns:a16="http://schemas.microsoft.com/office/drawing/2014/main" xmlns="" id="{B52B8D4B-4D82-E944-B2AB-55EDD7136F3D}"/>
+                <a16:creationId xmlns:a16="http://schemas.microsoft.com/office/drawing/2014/main" id="{B52B8D4B-4D82-E944-B2AB-55EDD7136F3D}"/>
               </a:ext>
             </a:extLst>
           </p:cNvPr>
@@ -270,7 +271,7 @@
           <a:lstStyle/>
           <a:p>
             <a:fld id="{BB79CAD0-7787-DB48-A7B7-D60CF264EBC2}" type="datetimeFigureOut">
-              <a:t>21.9.2018</a:t>
+              <a:t>24.9.18</a:t>
             </a:fld>
             <a:endParaRPr lang="sk-SK"/>
           </a:p>
@@ -281,7 +282,7 @@
           <p:cNvPr id="5" name="Footer Placeholder 4">
             <a:extLst>
               <a:ext uri="{FF2B5EF4-FFF2-40B4-BE49-F238E27FC236}">
-                <a16:creationId xmlns:a16="http://schemas.microsoft.com/office/drawing/2014/main" xmlns="" id="{CAD2672A-0550-CE43-80BE-EA825328F005}"/>
+                <a16:creationId xmlns:a16="http://schemas.microsoft.com/office/drawing/2014/main" id="{CAD2672A-0550-CE43-80BE-EA825328F005}"/>
               </a:ext>
             </a:extLst>
           </p:cNvPr>
@@ -306,7 +307,7 @@
           <p:cNvPr id="6" name="Slide Number Placeholder 5">
             <a:extLst>
               <a:ext uri="{FF2B5EF4-FFF2-40B4-BE49-F238E27FC236}">
-                <a16:creationId xmlns:a16="http://schemas.microsoft.com/office/drawing/2014/main" xmlns="" id="{C54D2670-D4BD-2448-92C6-FE64135D6077}"/>
+                <a16:creationId xmlns:a16="http://schemas.microsoft.com/office/drawing/2014/main" id="{C54D2670-D4BD-2448-92C6-FE64135D6077}"/>
               </a:ext>
             </a:extLst>
           </p:cNvPr>
@@ -364,7 +365,7 @@
           <p:cNvPr id="2" name="Title 1">
             <a:extLst>
               <a:ext uri="{FF2B5EF4-FFF2-40B4-BE49-F238E27FC236}">
-                <a16:creationId xmlns:a16="http://schemas.microsoft.com/office/drawing/2014/main" xmlns="" id="{39D41DD8-3146-E848-9D22-5F22B39DC7C1}"/>
+                <a16:creationId xmlns:a16="http://schemas.microsoft.com/office/drawing/2014/main" id="{39D41DD8-3146-E848-9D22-5F22B39DC7C1}"/>
               </a:ext>
             </a:extLst>
           </p:cNvPr>
@@ -393,7 +394,7 @@
           <p:cNvPr id="3" name="Vertical Text Placeholder 2">
             <a:extLst>
               <a:ext uri="{FF2B5EF4-FFF2-40B4-BE49-F238E27FC236}">
-                <a16:creationId xmlns:a16="http://schemas.microsoft.com/office/drawing/2014/main" xmlns="" id="{121A88ED-0989-3941-B0AC-35E581D8481F}"/>
+                <a16:creationId xmlns:a16="http://schemas.microsoft.com/office/drawing/2014/main" id="{121A88ED-0989-3941-B0AC-35E581D8481F}"/>
               </a:ext>
             </a:extLst>
           </p:cNvPr>
@@ -451,7 +452,7 @@
           <p:cNvPr id="4" name="Date Placeholder 3">
             <a:extLst>
               <a:ext uri="{FF2B5EF4-FFF2-40B4-BE49-F238E27FC236}">
-                <a16:creationId xmlns:a16="http://schemas.microsoft.com/office/drawing/2014/main" xmlns="" id="{E05E1CAB-B4A8-2345-92AA-0478AA89FAA1}"/>
+                <a16:creationId xmlns:a16="http://schemas.microsoft.com/office/drawing/2014/main" id="{E05E1CAB-B4A8-2345-92AA-0478AA89FAA1}"/>
               </a:ext>
             </a:extLst>
           </p:cNvPr>
@@ -468,7 +469,7 @@
           <a:lstStyle/>
           <a:p>
             <a:fld id="{BB79CAD0-7787-DB48-A7B7-D60CF264EBC2}" type="datetimeFigureOut">
-              <a:t>21.9.2018</a:t>
+              <a:t>24.9.18</a:t>
             </a:fld>
             <a:endParaRPr lang="sk-SK"/>
           </a:p>
@@ -479,7 +480,7 @@
           <p:cNvPr id="5" name="Footer Placeholder 4">
             <a:extLst>
               <a:ext uri="{FF2B5EF4-FFF2-40B4-BE49-F238E27FC236}">
-                <a16:creationId xmlns:a16="http://schemas.microsoft.com/office/drawing/2014/main" xmlns="" id="{33835C04-BD9C-2249-B035-C817C13B8898}"/>
+                <a16:creationId xmlns:a16="http://schemas.microsoft.com/office/drawing/2014/main" id="{33835C04-BD9C-2249-B035-C817C13B8898}"/>
               </a:ext>
             </a:extLst>
           </p:cNvPr>
@@ -504,7 +505,7 @@
           <p:cNvPr id="6" name="Slide Number Placeholder 5">
             <a:extLst>
               <a:ext uri="{FF2B5EF4-FFF2-40B4-BE49-F238E27FC236}">
-                <a16:creationId xmlns:a16="http://schemas.microsoft.com/office/drawing/2014/main" xmlns="" id="{BF537F4E-F135-574E-831D-4DDFFF38B7D3}"/>
+                <a16:creationId xmlns:a16="http://schemas.microsoft.com/office/drawing/2014/main" id="{BF537F4E-F135-574E-831D-4DDFFF38B7D3}"/>
               </a:ext>
             </a:extLst>
           </p:cNvPr>
@@ -562,7 +563,7 @@
           <p:cNvPr id="2" name="Vertical Title 1">
             <a:extLst>
               <a:ext uri="{FF2B5EF4-FFF2-40B4-BE49-F238E27FC236}">
-                <a16:creationId xmlns:a16="http://schemas.microsoft.com/office/drawing/2014/main" xmlns="" id="{08623A83-DB73-744F-A758-36DF936669AF}"/>
+                <a16:creationId xmlns:a16="http://schemas.microsoft.com/office/drawing/2014/main" id="{08623A83-DB73-744F-A758-36DF936669AF}"/>
               </a:ext>
             </a:extLst>
           </p:cNvPr>
@@ -596,7 +597,7 @@
           <p:cNvPr id="3" name="Vertical Text Placeholder 2">
             <a:extLst>
               <a:ext uri="{FF2B5EF4-FFF2-40B4-BE49-F238E27FC236}">
-                <a16:creationId xmlns:a16="http://schemas.microsoft.com/office/drawing/2014/main" xmlns="" id="{ACDA3943-D159-914D-B62A-7B5881728213}"/>
+                <a16:creationId xmlns:a16="http://schemas.microsoft.com/office/drawing/2014/main" id="{ACDA3943-D159-914D-B62A-7B5881728213}"/>
               </a:ext>
             </a:extLst>
           </p:cNvPr>
@@ -659,7 +660,7 @@
           <p:cNvPr id="4" name="Date Placeholder 3">
             <a:extLst>
               <a:ext uri="{FF2B5EF4-FFF2-40B4-BE49-F238E27FC236}">
-                <a16:creationId xmlns:a16="http://schemas.microsoft.com/office/drawing/2014/main" xmlns="" id="{0B32213C-ECBC-624D-9514-C399C2C6DDF0}"/>
+                <a16:creationId xmlns:a16="http://schemas.microsoft.com/office/drawing/2014/main" id="{0B32213C-ECBC-624D-9514-C399C2C6DDF0}"/>
               </a:ext>
             </a:extLst>
           </p:cNvPr>
@@ -676,7 +677,7 @@
           <a:lstStyle/>
           <a:p>
             <a:fld id="{BB79CAD0-7787-DB48-A7B7-D60CF264EBC2}" type="datetimeFigureOut">
-              <a:t>21.9.2018</a:t>
+              <a:t>24.9.18</a:t>
             </a:fld>
             <a:endParaRPr lang="sk-SK"/>
           </a:p>
@@ -687,7 +688,7 @@
           <p:cNvPr id="5" name="Footer Placeholder 4">
             <a:extLst>
               <a:ext uri="{FF2B5EF4-FFF2-40B4-BE49-F238E27FC236}">
-                <a16:creationId xmlns:a16="http://schemas.microsoft.com/office/drawing/2014/main" xmlns="" id="{D556E6B4-711A-5444-9634-25DB5AC4E5C5}"/>
+                <a16:creationId xmlns:a16="http://schemas.microsoft.com/office/drawing/2014/main" id="{D556E6B4-711A-5444-9634-25DB5AC4E5C5}"/>
               </a:ext>
             </a:extLst>
           </p:cNvPr>
@@ -712,7 +713,7 @@
           <p:cNvPr id="6" name="Slide Number Placeholder 5">
             <a:extLst>
               <a:ext uri="{FF2B5EF4-FFF2-40B4-BE49-F238E27FC236}">
-                <a16:creationId xmlns:a16="http://schemas.microsoft.com/office/drawing/2014/main" xmlns="" id="{15BC0D00-3AB2-7B47-A4B4-B433D1C173F6}"/>
+                <a16:creationId xmlns:a16="http://schemas.microsoft.com/office/drawing/2014/main" id="{15BC0D00-3AB2-7B47-A4B4-B433D1C173F6}"/>
               </a:ext>
             </a:extLst>
           </p:cNvPr>
@@ -770,7 +771,7 @@
           <p:cNvPr id="2" name="Title 1">
             <a:extLst>
               <a:ext uri="{FF2B5EF4-FFF2-40B4-BE49-F238E27FC236}">
-                <a16:creationId xmlns:a16="http://schemas.microsoft.com/office/drawing/2014/main" xmlns="" id="{67299BD9-9DC1-C344-912E-889DD2F0AFDC}"/>
+                <a16:creationId xmlns:a16="http://schemas.microsoft.com/office/drawing/2014/main" id="{67299BD9-9DC1-C344-912E-889DD2F0AFDC}"/>
               </a:ext>
             </a:extLst>
           </p:cNvPr>
@@ -799,7 +800,7 @@
           <p:cNvPr id="3" name="Content Placeholder 2">
             <a:extLst>
               <a:ext uri="{FF2B5EF4-FFF2-40B4-BE49-F238E27FC236}">
-                <a16:creationId xmlns:a16="http://schemas.microsoft.com/office/drawing/2014/main" xmlns="" id="{ADEA744B-B0F4-9B44-A790-C58836EA733A}"/>
+                <a16:creationId xmlns:a16="http://schemas.microsoft.com/office/drawing/2014/main" id="{ADEA744B-B0F4-9B44-A790-C58836EA733A}"/>
               </a:ext>
             </a:extLst>
           </p:cNvPr>
@@ -857,7 +858,7 @@
           <p:cNvPr id="4" name="Date Placeholder 3">
             <a:extLst>
               <a:ext uri="{FF2B5EF4-FFF2-40B4-BE49-F238E27FC236}">
-                <a16:creationId xmlns:a16="http://schemas.microsoft.com/office/drawing/2014/main" xmlns="" id="{D856EC1B-96FC-0D40-A704-D4E2B942E8C4}"/>
+                <a16:creationId xmlns:a16="http://schemas.microsoft.com/office/drawing/2014/main" id="{D856EC1B-96FC-0D40-A704-D4E2B942E8C4}"/>
               </a:ext>
             </a:extLst>
           </p:cNvPr>
@@ -874,7 +875,7 @@
           <a:lstStyle/>
           <a:p>
             <a:fld id="{BB79CAD0-7787-DB48-A7B7-D60CF264EBC2}" type="datetimeFigureOut">
-              <a:t>21.9.2018</a:t>
+              <a:t>24.9.18</a:t>
             </a:fld>
             <a:endParaRPr lang="sk-SK"/>
           </a:p>
@@ -885,7 +886,7 @@
           <p:cNvPr id="5" name="Footer Placeholder 4">
             <a:extLst>
               <a:ext uri="{FF2B5EF4-FFF2-40B4-BE49-F238E27FC236}">
-                <a16:creationId xmlns:a16="http://schemas.microsoft.com/office/drawing/2014/main" xmlns="" id="{6EA72C09-6B14-F54C-85C3-EF5962992451}"/>
+                <a16:creationId xmlns:a16="http://schemas.microsoft.com/office/drawing/2014/main" id="{6EA72C09-6B14-F54C-85C3-EF5962992451}"/>
               </a:ext>
             </a:extLst>
           </p:cNvPr>
@@ -910,7 +911,7 @@
           <p:cNvPr id="6" name="Slide Number Placeholder 5">
             <a:extLst>
               <a:ext uri="{FF2B5EF4-FFF2-40B4-BE49-F238E27FC236}">
-                <a16:creationId xmlns:a16="http://schemas.microsoft.com/office/drawing/2014/main" xmlns="" id="{6C189448-0694-894F-AC1E-3B3C42377F1E}"/>
+                <a16:creationId xmlns:a16="http://schemas.microsoft.com/office/drawing/2014/main" id="{6C189448-0694-894F-AC1E-3B3C42377F1E}"/>
               </a:ext>
             </a:extLst>
           </p:cNvPr>
@@ -968,7 +969,7 @@
           <p:cNvPr id="2" name="Title 1">
             <a:extLst>
               <a:ext uri="{FF2B5EF4-FFF2-40B4-BE49-F238E27FC236}">
-                <a16:creationId xmlns:a16="http://schemas.microsoft.com/office/drawing/2014/main" xmlns="" id="{7FBA234F-1992-F649-B883-1715B7C01277}"/>
+                <a16:creationId xmlns:a16="http://schemas.microsoft.com/office/drawing/2014/main" id="{7FBA234F-1992-F649-B883-1715B7C01277}"/>
               </a:ext>
             </a:extLst>
           </p:cNvPr>
@@ -1006,7 +1007,7 @@
           <p:cNvPr id="3" name="Text Placeholder 2">
             <a:extLst>
               <a:ext uri="{FF2B5EF4-FFF2-40B4-BE49-F238E27FC236}">
-                <a16:creationId xmlns:a16="http://schemas.microsoft.com/office/drawing/2014/main" xmlns="" id="{F346CCF0-6AC4-9E4E-80EE-35AAA065F284}"/>
+                <a16:creationId xmlns:a16="http://schemas.microsoft.com/office/drawing/2014/main" id="{F346CCF0-6AC4-9E4E-80EE-35AAA065F284}"/>
               </a:ext>
             </a:extLst>
           </p:cNvPr>
@@ -1131,7 +1132,7 @@
           <p:cNvPr id="4" name="Date Placeholder 3">
             <a:extLst>
               <a:ext uri="{FF2B5EF4-FFF2-40B4-BE49-F238E27FC236}">
-                <a16:creationId xmlns:a16="http://schemas.microsoft.com/office/drawing/2014/main" xmlns="" id="{D53DE633-6936-2747-9A86-B42984134ABA}"/>
+                <a16:creationId xmlns:a16="http://schemas.microsoft.com/office/drawing/2014/main" id="{D53DE633-6936-2747-9A86-B42984134ABA}"/>
               </a:ext>
             </a:extLst>
           </p:cNvPr>
@@ -1148,7 +1149,7 @@
           <a:lstStyle/>
           <a:p>
             <a:fld id="{BB79CAD0-7787-DB48-A7B7-D60CF264EBC2}" type="datetimeFigureOut">
-              <a:t>21.9.2018</a:t>
+              <a:t>24.9.18</a:t>
             </a:fld>
             <a:endParaRPr lang="sk-SK"/>
           </a:p>
@@ -1159,7 +1160,7 @@
           <p:cNvPr id="5" name="Footer Placeholder 4">
             <a:extLst>
               <a:ext uri="{FF2B5EF4-FFF2-40B4-BE49-F238E27FC236}">
-                <a16:creationId xmlns:a16="http://schemas.microsoft.com/office/drawing/2014/main" xmlns="" id="{A2DEAD04-DA25-2F43-BCAC-129BB0850CF0}"/>
+                <a16:creationId xmlns:a16="http://schemas.microsoft.com/office/drawing/2014/main" id="{A2DEAD04-DA25-2F43-BCAC-129BB0850CF0}"/>
               </a:ext>
             </a:extLst>
           </p:cNvPr>
@@ -1184,7 +1185,7 @@
           <p:cNvPr id="6" name="Slide Number Placeholder 5">
             <a:extLst>
               <a:ext uri="{FF2B5EF4-FFF2-40B4-BE49-F238E27FC236}">
-                <a16:creationId xmlns:a16="http://schemas.microsoft.com/office/drawing/2014/main" xmlns="" id="{612F6847-092A-0F4F-BBDF-AB89464911C5}"/>
+                <a16:creationId xmlns:a16="http://schemas.microsoft.com/office/drawing/2014/main" id="{612F6847-092A-0F4F-BBDF-AB89464911C5}"/>
               </a:ext>
             </a:extLst>
           </p:cNvPr>
@@ -1242,7 +1243,7 @@
           <p:cNvPr id="2" name="Title 1">
             <a:extLst>
               <a:ext uri="{FF2B5EF4-FFF2-40B4-BE49-F238E27FC236}">
-                <a16:creationId xmlns:a16="http://schemas.microsoft.com/office/drawing/2014/main" xmlns="" id="{C879CB75-101A-884F-8BC4-82D2EB564A6F}"/>
+                <a16:creationId xmlns:a16="http://schemas.microsoft.com/office/drawing/2014/main" id="{C879CB75-101A-884F-8BC4-82D2EB564A6F}"/>
               </a:ext>
             </a:extLst>
           </p:cNvPr>
@@ -1271,7 +1272,7 @@
           <p:cNvPr id="3" name="Content Placeholder 2">
             <a:extLst>
               <a:ext uri="{FF2B5EF4-FFF2-40B4-BE49-F238E27FC236}">
-                <a16:creationId xmlns:a16="http://schemas.microsoft.com/office/drawing/2014/main" xmlns="" id="{68D982A4-B0B7-C24A-9B50-E98F7279EEEE}"/>
+                <a16:creationId xmlns:a16="http://schemas.microsoft.com/office/drawing/2014/main" id="{68D982A4-B0B7-C24A-9B50-E98F7279EEEE}"/>
               </a:ext>
             </a:extLst>
           </p:cNvPr>
@@ -1334,7 +1335,7 @@
           <p:cNvPr id="4" name="Content Placeholder 3">
             <a:extLst>
               <a:ext uri="{FF2B5EF4-FFF2-40B4-BE49-F238E27FC236}">
-                <a16:creationId xmlns:a16="http://schemas.microsoft.com/office/drawing/2014/main" xmlns="" id="{E77BE374-D6EE-AA40-A74B-A03BAD550590}"/>
+                <a16:creationId xmlns:a16="http://schemas.microsoft.com/office/drawing/2014/main" id="{E77BE374-D6EE-AA40-A74B-A03BAD550590}"/>
               </a:ext>
             </a:extLst>
           </p:cNvPr>
@@ -1397,7 +1398,7 @@
           <p:cNvPr id="5" name="Date Placeholder 4">
             <a:extLst>
               <a:ext uri="{FF2B5EF4-FFF2-40B4-BE49-F238E27FC236}">
-                <a16:creationId xmlns:a16="http://schemas.microsoft.com/office/drawing/2014/main" xmlns="" id="{DAB863C0-EF8C-0943-A0E1-2BB927FA61D5}"/>
+                <a16:creationId xmlns:a16="http://schemas.microsoft.com/office/drawing/2014/main" id="{DAB863C0-EF8C-0943-A0E1-2BB927FA61D5}"/>
               </a:ext>
             </a:extLst>
           </p:cNvPr>
@@ -1414,7 +1415,7 @@
           <a:lstStyle/>
           <a:p>
             <a:fld id="{BB79CAD0-7787-DB48-A7B7-D60CF264EBC2}" type="datetimeFigureOut">
-              <a:t>21.9.2018</a:t>
+              <a:t>24.9.18</a:t>
             </a:fld>
             <a:endParaRPr lang="sk-SK"/>
           </a:p>
@@ -1425,7 +1426,7 @@
           <p:cNvPr id="6" name="Footer Placeholder 5">
             <a:extLst>
               <a:ext uri="{FF2B5EF4-FFF2-40B4-BE49-F238E27FC236}">
-                <a16:creationId xmlns:a16="http://schemas.microsoft.com/office/drawing/2014/main" xmlns="" id="{D33E85F5-344A-A040-9B45-2FDAFAF67998}"/>
+                <a16:creationId xmlns:a16="http://schemas.microsoft.com/office/drawing/2014/main" id="{D33E85F5-344A-A040-9B45-2FDAFAF67998}"/>
               </a:ext>
             </a:extLst>
           </p:cNvPr>
@@ -1450,7 +1451,7 @@
           <p:cNvPr id="7" name="Slide Number Placeholder 6">
             <a:extLst>
               <a:ext uri="{FF2B5EF4-FFF2-40B4-BE49-F238E27FC236}">
-                <a16:creationId xmlns:a16="http://schemas.microsoft.com/office/drawing/2014/main" xmlns="" id="{B6277BF7-7498-3C45-8BA3-BD5E32AAEBD5}"/>
+                <a16:creationId xmlns:a16="http://schemas.microsoft.com/office/drawing/2014/main" id="{B6277BF7-7498-3C45-8BA3-BD5E32AAEBD5}"/>
               </a:ext>
             </a:extLst>
           </p:cNvPr>
@@ -1508,7 +1509,7 @@
           <p:cNvPr id="2" name="Title 1">
             <a:extLst>
               <a:ext uri="{FF2B5EF4-FFF2-40B4-BE49-F238E27FC236}">
-                <a16:creationId xmlns:a16="http://schemas.microsoft.com/office/drawing/2014/main" xmlns="" id="{9070BF82-A9E2-E44E-BDF7-FEA46C75D780}"/>
+                <a16:creationId xmlns:a16="http://schemas.microsoft.com/office/drawing/2014/main" id="{9070BF82-A9E2-E44E-BDF7-FEA46C75D780}"/>
               </a:ext>
             </a:extLst>
           </p:cNvPr>
@@ -1542,7 +1543,7 @@
           <p:cNvPr id="3" name="Text Placeholder 2">
             <a:extLst>
               <a:ext uri="{FF2B5EF4-FFF2-40B4-BE49-F238E27FC236}">
-                <a16:creationId xmlns:a16="http://schemas.microsoft.com/office/drawing/2014/main" xmlns="" id="{645AEF9D-2E1F-824F-8B5D-E04A7B6B3C0B}"/>
+                <a16:creationId xmlns:a16="http://schemas.microsoft.com/office/drawing/2014/main" id="{645AEF9D-2E1F-824F-8B5D-E04A7B6B3C0B}"/>
               </a:ext>
             </a:extLst>
           </p:cNvPr>
@@ -1613,7 +1614,7 @@
           <p:cNvPr id="4" name="Content Placeholder 3">
             <a:extLst>
               <a:ext uri="{FF2B5EF4-FFF2-40B4-BE49-F238E27FC236}">
-                <a16:creationId xmlns:a16="http://schemas.microsoft.com/office/drawing/2014/main" xmlns="" id="{A0FEBADB-3BFC-DD4E-B7AB-953C504769D7}"/>
+                <a16:creationId xmlns:a16="http://schemas.microsoft.com/office/drawing/2014/main" id="{A0FEBADB-3BFC-DD4E-B7AB-953C504769D7}"/>
               </a:ext>
             </a:extLst>
           </p:cNvPr>
@@ -1676,7 +1677,7 @@
           <p:cNvPr id="5" name="Text Placeholder 4">
             <a:extLst>
               <a:ext uri="{FF2B5EF4-FFF2-40B4-BE49-F238E27FC236}">
-                <a16:creationId xmlns:a16="http://schemas.microsoft.com/office/drawing/2014/main" xmlns="" id="{46794B2E-E171-5047-A005-D4E26A885E4E}"/>
+                <a16:creationId xmlns:a16="http://schemas.microsoft.com/office/drawing/2014/main" id="{46794B2E-E171-5047-A005-D4E26A885E4E}"/>
               </a:ext>
             </a:extLst>
           </p:cNvPr>
@@ -1747,7 +1748,7 @@
           <p:cNvPr id="6" name="Content Placeholder 5">
             <a:extLst>
               <a:ext uri="{FF2B5EF4-FFF2-40B4-BE49-F238E27FC236}">
-                <a16:creationId xmlns:a16="http://schemas.microsoft.com/office/drawing/2014/main" xmlns="" id="{B9D7F2A2-9DDF-594E-B269-E58E6CD56008}"/>
+                <a16:creationId xmlns:a16="http://schemas.microsoft.com/office/drawing/2014/main" id="{B9D7F2A2-9DDF-594E-B269-E58E6CD56008}"/>
               </a:ext>
             </a:extLst>
           </p:cNvPr>
@@ -1810,7 +1811,7 @@
           <p:cNvPr id="7" name="Date Placeholder 6">
             <a:extLst>
               <a:ext uri="{FF2B5EF4-FFF2-40B4-BE49-F238E27FC236}">
-                <a16:creationId xmlns:a16="http://schemas.microsoft.com/office/drawing/2014/main" xmlns="" id="{B8CD6523-CAFF-2147-9ACA-09C6D0DF38E1}"/>
+                <a16:creationId xmlns:a16="http://schemas.microsoft.com/office/drawing/2014/main" id="{B8CD6523-CAFF-2147-9ACA-09C6D0DF38E1}"/>
               </a:ext>
             </a:extLst>
           </p:cNvPr>
@@ -1827,7 +1828,7 @@
           <a:lstStyle/>
           <a:p>
             <a:fld id="{BB79CAD0-7787-DB48-A7B7-D60CF264EBC2}" type="datetimeFigureOut">
-              <a:t>21.9.2018</a:t>
+              <a:t>24.9.18</a:t>
             </a:fld>
             <a:endParaRPr lang="sk-SK"/>
           </a:p>
@@ -1838,7 +1839,7 @@
           <p:cNvPr id="8" name="Footer Placeholder 7">
             <a:extLst>
               <a:ext uri="{FF2B5EF4-FFF2-40B4-BE49-F238E27FC236}">
-                <a16:creationId xmlns:a16="http://schemas.microsoft.com/office/drawing/2014/main" xmlns="" id="{60E519A9-4BAE-8241-9C03-AD1CE129ECF2}"/>
+                <a16:creationId xmlns:a16="http://schemas.microsoft.com/office/drawing/2014/main" id="{60E519A9-4BAE-8241-9C03-AD1CE129ECF2}"/>
               </a:ext>
             </a:extLst>
           </p:cNvPr>
@@ -1863,7 +1864,7 @@
           <p:cNvPr id="9" name="Slide Number Placeholder 8">
             <a:extLst>
               <a:ext uri="{FF2B5EF4-FFF2-40B4-BE49-F238E27FC236}">
-                <a16:creationId xmlns:a16="http://schemas.microsoft.com/office/drawing/2014/main" xmlns="" id="{93330404-444A-424A-BA39-27DF6ACC70A3}"/>
+                <a16:creationId xmlns:a16="http://schemas.microsoft.com/office/drawing/2014/main" id="{93330404-444A-424A-BA39-27DF6ACC70A3}"/>
               </a:ext>
             </a:extLst>
           </p:cNvPr>
@@ -1921,7 +1922,7 @@
           <p:cNvPr id="2" name="Title 1">
             <a:extLst>
               <a:ext uri="{FF2B5EF4-FFF2-40B4-BE49-F238E27FC236}">
-                <a16:creationId xmlns:a16="http://schemas.microsoft.com/office/drawing/2014/main" xmlns="" id="{5FE378DD-EAEA-6348-8645-71B2D8487367}"/>
+                <a16:creationId xmlns:a16="http://schemas.microsoft.com/office/drawing/2014/main" id="{5FE378DD-EAEA-6348-8645-71B2D8487367}"/>
               </a:ext>
             </a:extLst>
           </p:cNvPr>
@@ -1950,7 +1951,7 @@
           <p:cNvPr id="3" name="Date Placeholder 2">
             <a:extLst>
               <a:ext uri="{FF2B5EF4-FFF2-40B4-BE49-F238E27FC236}">
-                <a16:creationId xmlns:a16="http://schemas.microsoft.com/office/drawing/2014/main" xmlns="" id="{8CBD299B-DDA2-E64B-9AE5-C6B72718DAFA}"/>
+                <a16:creationId xmlns:a16="http://schemas.microsoft.com/office/drawing/2014/main" id="{8CBD299B-DDA2-E64B-9AE5-C6B72718DAFA}"/>
               </a:ext>
             </a:extLst>
           </p:cNvPr>
@@ -1967,7 +1968,7 @@
           <a:lstStyle/>
           <a:p>
             <a:fld id="{BB79CAD0-7787-DB48-A7B7-D60CF264EBC2}" type="datetimeFigureOut">
-              <a:t>21.9.2018</a:t>
+              <a:t>24.9.18</a:t>
             </a:fld>
             <a:endParaRPr lang="sk-SK"/>
           </a:p>
@@ -1978,7 +1979,7 @@
           <p:cNvPr id="4" name="Footer Placeholder 3">
             <a:extLst>
               <a:ext uri="{FF2B5EF4-FFF2-40B4-BE49-F238E27FC236}">
-                <a16:creationId xmlns:a16="http://schemas.microsoft.com/office/drawing/2014/main" xmlns="" id="{EC489813-8CB8-7242-B127-E728AB2A360D}"/>
+                <a16:creationId xmlns:a16="http://schemas.microsoft.com/office/drawing/2014/main" id="{EC489813-8CB8-7242-B127-E728AB2A360D}"/>
               </a:ext>
             </a:extLst>
           </p:cNvPr>
@@ -2003,7 +2004,7 @@
           <p:cNvPr id="5" name="Slide Number Placeholder 4">
             <a:extLst>
               <a:ext uri="{FF2B5EF4-FFF2-40B4-BE49-F238E27FC236}">
-                <a16:creationId xmlns:a16="http://schemas.microsoft.com/office/drawing/2014/main" xmlns="" id="{6759523F-5DCE-7D45-AA78-ACE2CCFBEE2D}"/>
+                <a16:creationId xmlns:a16="http://schemas.microsoft.com/office/drawing/2014/main" id="{6759523F-5DCE-7D45-AA78-ACE2CCFBEE2D}"/>
               </a:ext>
             </a:extLst>
           </p:cNvPr>
@@ -2061,7 +2062,7 @@
           <p:cNvPr id="2" name="Date Placeholder 1">
             <a:extLst>
               <a:ext uri="{FF2B5EF4-FFF2-40B4-BE49-F238E27FC236}">
-                <a16:creationId xmlns:a16="http://schemas.microsoft.com/office/drawing/2014/main" xmlns="" id="{DF6DC8C0-59FC-2945-B779-C12FE1DD7AED}"/>
+                <a16:creationId xmlns:a16="http://schemas.microsoft.com/office/drawing/2014/main" id="{DF6DC8C0-59FC-2945-B779-C12FE1DD7AED}"/>
               </a:ext>
             </a:extLst>
           </p:cNvPr>
@@ -2078,7 +2079,7 @@
           <a:lstStyle/>
           <a:p>
             <a:fld id="{BB79CAD0-7787-DB48-A7B7-D60CF264EBC2}" type="datetimeFigureOut">
-              <a:t>21.9.2018</a:t>
+              <a:t>24.9.18</a:t>
             </a:fld>
             <a:endParaRPr lang="sk-SK"/>
           </a:p>
@@ -2089,7 +2090,7 @@
           <p:cNvPr id="3" name="Footer Placeholder 2">
             <a:extLst>
               <a:ext uri="{FF2B5EF4-FFF2-40B4-BE49-F238E27FC236}">
-                <a16:creationId xmlns:a16="http://schemas.microsoft.com/office/drawing/2014/main" xmlns="" id="{DEA59ECB-69F0-7640-A7A0-A36BDC0DDEBF}"/>
+                <a16:creationId xmlns:a16="http://schemas.microsoft.com/office/drawing/2014/main" id="{DEA59ECB-69F0-7640-A7A0-A36BDC0DDEBF}"/>
               </a:ext>
             </a:extLst>
           </p:cNvPr>
@@ -2114,7 +2115,7 @@
           <p:cNvPr id="4" name="Slide Number Placeholder 3">
             <a:extLst>
               <a:ext uri="{FF2B5EF4-FFF2-40B4-BE49-F238E27FC236}">
-                <a16:creationId xmlns:a16="http://schemas.microsoft.com/office/drawing/2014/main" xmlns="" id="{98BF92D8-FF9A-2E4C-A2D6-431EA4E11A3C}"/>
+                <a16:creationId xmlns:a16="http://schemas.microsoft.com/office/drawing/2014/main" id="{98BF92D8-FF9A-2E4C-A2D6-431EA4E11A3C}"/>
               </a:ext>
             </a:extLst>
           </p:cNvPr>
@@ -2172,7 +2173,7 @@
           <p:cNvPr id="2" name="Title 1">
             <a:extLst>
               <a:ext uri="{FF2B5EF4-FFF2-40B4-BE49-F238E27FC236}">
-                <a16:creationId xmlns:a16="http://schemas.microsoft.com/office/drawing/2014/main" xmlns="" id="{B2712073-D91E-C043-857B-4BA212CFB7C3}"/>
+                <a16:creationId xmlns:a16="http://schemas.microsoft.com/office/drawing/2014/main" id="{B2712073-D91E-C043-857B-4BA212CFB7C3}"/>
               </a:ext>
             </a:extLst>
           </p:cNvPr>
@@ -2210,7 +2211,7 @@
           <p:cNvPr id="3" name="Content Placeholder 2">
             <a:extLst>
               <a:ext uri="{FF2B5EF4-FFF2-40B4-BE49-F238E27FC236}">
-                <a16:creationId xmlns:a16="http://schemas.microsoft.com/office/drawing/2014/main" xmlns="" id="{6F3770E6-DA01-AC47-BCD3-24AFD3C4EB39}"/>
+                <a16:creationId xmlns:a16="http://schemas.microsoft.com/office/drawing/2014/main" id="{6F3770E6-DA01-AC47-BCD3-24AFD3C4EB39}"/>
               </a:ext>
             </a:extLst>
           </p:cNvPr>
@@ -2301,7 +2302,7 @@
           <p:cNvPr id="4" name="Text Placeholder 3">
             <a:extLst>
               <a:ext uri="{FF2B5EF4-FFF2-40B4-BE49-F238E27FC236}">
-                <a16:creationId xmlns:a16="http://schemas.microsoft.com/office/drawing/2014/main" xmlns="" id="{CEBD0A55-C08E-4240-8CDF-F56590E16641}"/>
+                <a16:creationId xmlns:a16="http://schemas.microsoft.com/office/drawing/2014/main" id="{CEBD0A55-C08E-4240-8CDF-F56590E16641}"/>
               </a:ext>
             </a:extLst>
           </p:cNvPr>
@@ -2372,7 +2373,7 @@
           <p:cNvPr id="5" name="Date Placeholder 4">
             <a:extLst>
               <a:ext uri="{FF2B5EF4-FFF2-40B4-BE49-F238E27FC236}">
-                <a16:creationId xmlns:a16="http://schemas.microsoft.com/office/drawing/2014/main" xmlns="" id="{4E823046-F67C-6C4B-B831-8F9674AEED41}"/>
+                <a16:creationId xmlns:a16="http://schemas.microsoft.com/office/drawing/2014/main" id="{4E823046-F67C-6C4B-B831-8F9674AEED41}"/>
               </a:ext>
             </a:extLst>
           </p:cNvPr>
@@ -2389,7 +2390,7 @@
           <a:lstStyle/>
           <a:p>
             <a:fld id="{BB79CAD0-7787-DB48-A7B7-D60CF264EBC2}" type="datetimeFigureOut">
-              <a:t>21.9.2018</a:t>
+              <a:t>24.9.18</a:t>
             </a:fld>
             <a:endParaRPr lang="sk-SK"/>
           </a:p>
@@ -2400,7 +2401,7 @@
           <p:cNvPr id="6" name="Footer Placeholder 5">
             <a:extLst>
               <a:ext uri="{FF2B5EF4-FFF2-40B4-BE49-F238E27FC236}">
-                <a16:creationId xmlns:a16="http://schemas.microsoft.com/office/drawing/2014/main" xmlns="" id="{D4325925-E675-2D46-898D-4ECCE8BD65F2}"/>
+                <a16:creationId xmlns:a16="http://schemas.microsoft.com/office/drawing/2014/main" id="{D4325925-E675-2D46-898D-4ECCE8BD65F2}"/>
               </a:ext>
             </a:extLst>
           </p:cNvPr>
@@ -2425,7 +2426,7 @@
           <p:cNvPr id="7" name="Slide Number Placeholder 6">
             <a:extLst>
               <a:ext uri="{FF2B5EF4-FFF2-40B4-BE49-F238E27FC236}">
-                <a16:creationId xmlns:a16="http://schemas.microsoft.com/office/drawing/2014/main" xmlns="" id="{ECDB1FD3-2515-2F41-907E-11DF4722A66F}"/>
+                <a16:creationId xmlns:a16="http://schemas.microsoft.com/office/drawing/2014/main" id="{ECDB1FD3-2515-2F41-907E-11DF4722A66F}"/>
               </a:ext>
             </a:extLst>
           </p:cNvPr>
@@ -2483,7 +2484,7 @@
           <p:cNvPr id="2" name="Title 1">
             <a:extLst>
               <a:ext uri="{FF2B5EF4-FFF2-40B4-BE49-F238E27FC236}">
-                <a16:creationId xmlns:a16="http://schemas.microsoft.com/office/drawing/2014/main" xmlns="" id="{A00F10CA-F7DD-DA4A-8E6B-8703FA299FDE}"/>
+                <a16:creationId xmlns:a16="http://schemas.microsoft.com/office/drawing/2014/main" id="{A00F10CA-F7DD-DA4A-8E6B-8703FA299FDE}"/>
               </a:ext>
             </a:extLst>
           </p:cNvPr>
@@ -2521,7 +2522,7 @@
           <p:cNvPr id="3" name="Picture Placeholder 2">
             <a:extLst>
               <a:ext uri="{FF2B5EF4-FFF2-40B4-BE49-F238E27FC236}">
-                <a16:creationId xmlns:a16="http://schemas.microsoft.com/office/drawing/2014/main" xmlns="" id="{6461E66B-02E7-114C-8E9D-C36B958CE0EC}"/>
+                <a16:creationId xmlns:a16="http://schemas.microsoft.com/office/drawing/2014/main" id="{6461E66B-02E7-114C-8E9D-C36B958CE0EC}"/>
               </a:ext>
             </a:extLst>
           </p:cNvPr>
@@ -2588,7 +2589,7 @@
           <p:cNvPr id="4" name="Text Placeholder 3">
             <a:extLst>
               <a:ext uri="{FF2B5EF4-FFF2-40B4-BE49-F238E27FC236}">
-                <a16:creationId xmlns:a16="http://schemas.microsoft.com/office/drawing/2014/main" xmlns="" id="{ABD8C9A2-2B7D-1A47-B514-AFD84EC9D5FD}"/>
+                <a16:creationId xmlns:a16="http://schemas.microsoft.com/office/drawing/2014/main" id="{ABD8C9A2-2B7D-1A47-B514-AFD84EC9D5FD}"/>
               </a:ext>
             </a:extLst>
           </p:cNvPr>
@@ -2659,7 +2660,7 @@
           <p:cNvPr id="5" name="Date Placeholder 4">
             <a:extLst>
               <a:ext uri="{FF2B5EF4-FFF2-40B4-BE49-F238E27FC236}">
-                <a16:creationId xmlns:a16="http://schemas.microsoft.com/office/drawing/2014/main" xmlns="" id="{63722571-5538-F746-A135-93AEAB15FEA6}"/>
+                <a16:creationId xmlns:a16="http://schemas.microsoft.com/office/drawing/2014/main" id="{63722571-5538-F746-A135-93AEAB15FEA6}"/>
               </a:ext>
             </a:extLst>
           </p:cNvPr>
@@ -2676,7 +2677,7 @@
           <a:lstStyle/>
           <a:p>
             <a:fld id="{BB79CAD0-7787-DB48-A7B7-D60CF264EBC2}" type="datetimeFigureOut">
-              <a:t>21.9.2018</a:t>
+              <a:t>24.9.18</a:t>
             </a:fld>
             <a:endParaRPr lang="sk-SK"/>
           </a:p>
@@ -2687,7 +2688,7 @@
           <p:cNvPr id="6" name="Footer Placeholder 5">
             <a:extLst>
               <a:ext uri="{FF2B5EF4-FFF2-40B4-BE49-F238E27FC236}">
-                <a16:creationId xmlns:a16="http://schemas.microsoft.com/office/drawing/2014/main" xmlns="" id="{5B07E848-52E2-0B40-A387-5790FA8EB169}"/>
+                <a16:creationId xmlns:a16="http://schemas.microsoft.com/office/drawing/2014/main" id="{5B07E848-52E2-0B40-A387-5790FA8EB169}"/>
               </a:ext>
             </a:extLst>
           </p:cNvPr>
@@ -2712,7 +2713,7 @@
           <p:cNvPr id="7" name="Slide Number Placeholder 6">
             <a:extLst>
               <a:ext uri="{FF2B5EF4-FFF2-40B4-BE49-F238E27FC236}">
-                <a16:creationId xmlns:a16="http://schemas.microsoft.com/office/drawing/2014/main" xmlns="" id="{2542CB11-C47E-604E-9979-25A6F902E7DC}"/>
+                <a16:creationId xmlns:a16="http://schemas.microsoft.com/office/drawing/2014/main" id="{2542CB11-C47E-604E-9979-25A6F902E7DC}"/>
               </a:ext>
             </a:extLst>
           </p:cNvPr>
@@ -2775,7 +2776,7 @@
           <p:cNvPr id="2" name="Title Placeholder 1">
             <a:extLst>
               <a:ext uri="{FF2B5EF4-FFF2-40B4-BE49-F238E27FC236}">
-                <a16:creationId xmlns:a16="http://schemas.microsoft.com/office/drawing/2014/main" xmlns="" id="{79BF9A50-E4FA-5C4C-B871-2A30B492ED4E}"/>
+                <a16:creationId xmlns:a16="http://schemas.microsoft.com/office/drawing/2014/main" id="{79BF9A50-E4FA-5C4C-B871-2A30B492ED4E}"/>
               </a:ext>
             </a:extLst>
           </p:cNvPr>
@@ -2814,7 +2815,7 @@
           <p:cNvPr id="3" name="Text Placeholder 2">
             <a:extLst>
               <a:ext uri="{FF2B5EF4-FFF2-40B4-BE49-F238E27FC236}">
-                <a16:creationId xmlns:a16="http://schemas.microsoft.com/office/drawing/2014/main" xmlns="" id="{D106F673-4749-D240-A0A3-9C5D3311FF2D}"/>
+                <a16:creationId xmlns:a16="http://schemas.microsoft.com/office/drawing/2014/main" id="{D106F673-4749-D240-A0A3-9C5D3311FF2D}"/>
               </a:ext>
             </a:extLst>
           </p:cNvPr>
@@ -2882,7 +2883,7 @@
           <p:cNvPr id="4" name="Date Placeholder 3">
             <a:extLst>
               <a:ext uri="{FF2B5EF4-FFF2-40B4-BE49-F238E27FC236}">
-                <a16:creationId xmlns:a16="http://schemas.microsoft.com/office/drawing/2014/main" xmlns="" id="{86DDB9CD-F938-AB4C-B9CE-FDDF27BF794A}"/>
+                <a16:creationId xmlns:a16="http://schemas.microsoft.com/office/drawing/2014/main" id="{86DDB9CD-F938-AB4C-B9CE-FDDF27BF794A}"/>
               </a:ext>
             </a:extLst>
           </p:cNvPr>
@@ -2917,7 +2918,7 @@
           </a:lstStyle>
           <a:p>
             <a:fld id="{BB79CAD0-7787-DB48-A7B7-D60CF264EBC2}" type="datetimeFigureOut">
-              <a:t>21.9.2018</a:t>
+              <a:t>24.9.18</a:t>
             </a:fld>
             <a:endParaRPr lang="sk-SK"/>
           </a:p>
@@ -2928,7 +2929,7 @@
           <p:cNvPr id="5" name="Footer Placeholder 4">
             <a:extLst>
               <a:ext uri="{FF2B5EF4-FFF2-40B4-BE49-F238E27FC236}">
-                <a16:creationId xmlns:a16="http://schemas.microsoft.com/office/drawing/2014/main" xmlns="" id="{BEAAAD5C-EDD7-6640-BA68-33FCDCEDD4E6}"/>
+                <a16:creationId xmlns:a16="http://schemas.microsoft.com/office/drawing/2014/main" id="{BEAAAD5C-EDD7-6640-BA68-33FCDCEDD4E6}"/>
               </a:ext>
             </a:extLst>
           </p:cNvPr>
@@ -2971,7 +2972,7 @@
           <p:cNvPr id="6" name="Slide Number Placeholder 5">
             <a:extLst>
               <a:ext uri="{FF2B5EF4-FFF2-40B4-BE49-F238E27FC236}">
-                <a16:creationId xmlns:a16="http://schemas.microsoft.com/office/drawing/2014/main" xmlns="" id="{729228BE-4DBC-2649-BEB7-D8C76DF1CAFF}"/>
+                <a16:creationId xmlns:a16="http://schemas.microsoft.com/office/drawing/2014/main" id="{729228BE-4DBC-2649-BEB7-D8C76DF1CAFF}"/>
               </a:ext>
             </a:extLst>
           </p:cNvPr>
@@ -3338,7 +3339,7 @@
           <p:cNvPr id="2" name="Title 1">
             <a:extLst>
               <a:ext uri="{FF2B5EF4-FFF2-40B4-BE49-F238E27FC236}">
-                <a16:creationId xmlns:a16="http://schemas.microsoft.com/office/drawing/2014/main" xmlns="" id="{4DAB0987-2A13-8447-944C-3C61AA76DF8C}"/>
+                <a16:creationId xmlns:a16="http://schemas.microsoft.com/office/drawing/2014/main" id="{4DAB0987-2A13-8447-944C-3C61AA76DF8C}"/>
               </a:ext>
             </a:extLst>
           </p:cNvPr>
@@ -3366,7 +3367,7 @@
           <p:cNvPr id="3" name="Subtitle 2">
             <a:extLst>
               <a:ext uri="{FF2B5EF4-FFF2-40B4-BE49-F238E27FC236}">
-                <a16:creationId xmlns:a16="http://schemas.microsoft.com/office/drawing/2014/main" xmlns="" id="{A3FE9660-A6D3-3143-BD40-20B0AA2FF625}"/>
+                <a16:creationId xmlns:a16="http://schemas.microsoft.com/office/drawing/2014/main" id="{A3FE9660-A6D3-3143-BD40-20B0AA2FF625}"/>
               </a:ext>
             </a:extLst>
           </p:cNvPr>
@@ -3432,19 +3433,174 @@
           <a:lstStyle/>
           <a:p>
             <a:r>
-              <a:rPr lang="en-US" dirty="0" smtClean="0"/>
+              <a:rPr lang="en-US" dirty="0"/>
+              <a:t>Exploratory testing – strings and codepoints</a:t>
+            </a:r>
+            <a:endParaRPr lang="sk-SK" dirty="0"/>
+          </a:p>
+        </p:txBody>
+      </p:sp>
+      <p:sp>
+        <p:nvSpPr>
+          <p:cNvPr id="3" name="Content Placeholder 2"/>
+          <p:cNvSpPr>
+            <a:spLocks noGrp="1"/>
+          </p:cNvSpPr>
+          <p:nvPr>
+            <p:ph idx="1"/>
+          </p:nvPr>
+        </p:nvSpPr>
+        <p:spPr>
+          <a:xfrm>
+            <a:off x="838200" y="1825625"/>
+            <a:ext cx="3066535" cy="4351338"/>
+          </a:xfrm>
+        </p:spPr>
+        <p:txBody>
+          <a:bodyPr>
+            <a:normAutofit fontScale="92500" lnSpcReduction="10000"/>
+          </a:bodyPr>
+          <a:lstStyle/>
+          <a:p>
+            <a:r>
+              <a:rPr lang="en-US" dirty="0"/>
+              <a:t>Na </a:t>
+            </a:r>
+            <a:r>
+              <a:rPr lang="en-US" dirty="0" err="1"/>
+              <a:t>prednaske</a:t>
+            </a:r>
+            <a:r>
+              <a:rPr lang="en-US" dirty="0"/>
+              <a:t> </a:t>
+            </a:r>
+            <a:r>
+              <a:rPr lang="en-US" dirty="0" err="1"/>
+              <a:t>som</a:t>
+            </a:r>
+            <a:r>
+              <a:rPr lang="en-US" dirty="0"/>
+              <a:t> </a:t>
+            </a:r>
+            <a:r>
+              <a:rPr lang="en-US" dirty="0" err="1"/>
+              <a:t>nepochopil</a:t>
+            </a:r>
+            <a:r>
+              <a:rPr lang="en-US" dirty="0"/>
+              <a:t> </a:t>
+            </a:r>
+            <a:r>
+              <a:rPr lang="en-US" dirty="0" err="1"/>
+              <a:t>celkom</a:t>
+            </a:r>
+            <a:r>
+              <a:rPr lang="en-US" dirty="0"/>
+              <a:t> co su codePoints a naco su</a:t>
+            </a:r>
+          </a:p>
+          <a:p>
+            <a:r>
+              <a:rPr lang="en-US" dirty="0"/>
+              <a:t>tak si spravte exploratory testik na toto napriklad a pozrite si kazde API ako je "emoji aware" (</a:t>
+            </a:r>
+            <a:r>
+              <a:rPr lang="sk-SK"/>
+              <a:t>supplementary planes)</a:t>
+            </a:r>
+            <a:endParaRPr lang="sk-SK" dirty="0"/>
+          </a:p>
+        </p:txBody>
+      </p:sp>
+      <p:pic>
+        <p:nvPicPr>
+          <p:cNvPr id="5" name="Content Placeholder 3">
+            <a:extLst>
+              <a:ext uri="{FF2B5EF4-FFF2-40B4-BE49-F238E27FC236}">
+                <a16:creationId xmlns:a16="http://schemas.microsoft.com/office/drawing/2014/main" id="{5F9CC660-F67B-3746-AC29-42BF26B0A612}"/>
+              </a:ext>
+            </a:extLst>
+          </p:cNvPr>
+          <p:cNvPicPr>
+            <a:picLocks noChangeAspect="1"/>
+          </p:cNvPicPr>
+          <p:nvPr/>
+        </p:nvPicPr>
+        <p:blipFill>
+          <a:blip r:embed="rId2"/>
+          <a:stretch>
+            <a:fillRect/>
+          </a:stretch>
+        </p:blipFill>
+        <p:spPr>
+          <a:xfrm>
+            <a:off x="4612193" y="1588492"/>
+            <a:ext cx="5573769" cy="4588471"/>
+          </a:xfrm>
+          <a:prstGeom prst="rect">
+            <a:avLst/>
+          </a:prstGeom>
+        </p:spPr>
+      </p:pic>
+    </p:spTree>
+    <p:extLst>
+      <p:ext uri="{BB962C8B-B14F-4D97-AF65-F5344CB8AC3E}">
+        <p14:creationId xmlns:p14="http://schemas.microsoft.com/office/powerpoint/2010/main" val="528229857"/>
+      </p:ext>
+    </p:extLst>
+  </p:cSld>
+  <p:clrMapOvr>
+    <a:masterClrMapping/>
+  </p:clrMapOvr>
+</p:sld>
+</file>
+
+<file path=ppt/slides/slide11.xml><?xml version="1.0" encoding="utf-8"?>
+<p:sld xmlns:a="http://schemas.openxmlformats.org/drawingml/2006/main" xmlns:r="http://schemas.openxmlformats.org/officeDocument/2006/relationships" xmlns:p="http://schemas.openxmlformats.org/presentationml/2006/main">
+  <p:cSld>
+    <p:spTree>
+      <p:nvGrpSpPr>
+        <p:cNvPr id="1" name=""/>
+        <p:cNvGrpSpPr/>
+        <p:nvPr/>
+      </p:nvGrpSpPr>
+      <p:grpSpPr>
+        <a:xfrm>
+          <a:off x="0" y="0"/>
+          <a:ext cx="0" cy="0"/>
+          <a:chOff x="0" y="0"/>
+          <a:chExt cx="0" cy="0"/>
+        </a:xfrm>
+      </p:grpSpPr>
+      <p:sp>
+        <p:nvSpPr>
+          <p:cNvPr id="2" name="Title 1"/>
+          <p:cNvSpPr>
+            <a:spLocks noGrp="1"/>
+          </p:cNvSpPr>
+          <p:nvPr>
+            <p:ph type="title"/>
+          </p:nvPr>
+        </p:nvSpPr>
+        <p:spPr/>
+        <p:txBody>
+          <a:bodyPr/>
+          <a:lstStyle/>
+          <a:p>
+            <a:r>
+              <a:rPr lang="en-US" dirty="0"/>
               <a:t>POC – </a:t>
             </a:r>
             <a:r>
-              <a:rPr lang="en-US" dirty="0" err="1" smtClean="0"/>
+              <a:rPr lang="en-US" dirty="0" err="1"/>
               <a:t>Proove</a:t>
             </a:r>
             <a:r>
-              <a:rPr lang="en-US" dirty="0" smtClean="0"/>
+              <a:rPr lang="en-US" dirty="0"/>
               <a:t> of Concept</a:t>
             </a:r>
             <a:br>
-              <a:rPr lang="en-US" dirty="0" smtClean="0"/>
+              <a:rPr lang="en-US" dirty="0"/>
             </a:br>
             <a:endParaRPr lang="sk-SK" dirty="0"/>
           </a:p>
@@ -3473,219 +3629,219 @@
           <a:lstStyle/>
           <a:p>
             <a:r>
-              <a:rPr lang="en-US" dirty="0" err="1" smtClean="0"/>
+              <a:rPr lang="en-US" dirty="0" err="1"/>
               <a:t>Niekedy</a:t>
             </a:r>
             <a:r>
-              <a:rPr lang="en-US" dirty="0" smtClean="0"/>
+              <a:rPr lang="en-US" dirty="0"/>
               <a:t> test </a:t>
             </a:r>
             <a:r>
-              <a:rPr lang="en-US" dirty="0" err="1" smtClean="0"/>
+              <a:rPr lang="en-US" dirty="0" err="1"/>
               <a:t>pouzivam</a:t>
             </a:r>
             <a:r>
-              <a:rPr lang="en-US" dirty="0" smtClean="0"/>
-              <a:t> </a:t>
-            </a:r>
-            <a:r>
-              <a:rPr lang="en-US" dirty="0" err="1" smtClean="0"/>
+              <a:rPr lang="en-US" dirty="0"/>
+              <a:t> </a:t>
+            </a:r>
+            <a:r>
+              <a:rPr lang="en-US" dirty="0" err="1"/>
               <a:t>aj</a:t>
             </a:r>
             <a:r>
-              <a:rPr lang="en-US" dirty="0" smtClean="0"/>
-              <a:t> </a:t>
-            </a:r>
-            <a:r>
-              <a:rPr lang="en-US" dirty="0" err="1" smtClean="0"/>
+              <a:rPr lang="en-US" dirty="0"/>
+              <a:t> </a:t>
+            </a:r>
+            <a:r>
+              <a:rPr lang="en-US" dirty="0" err="1"/>
               <a:t>na</a:t>
             </a:r>
             <a:r>
-              <a:rPr lang="en-US" dirty="0" smtClean="0"/>
-              <a:t> </a:t>
-            </a:r>
-            <a:r>
-              <a:rPr lang="en-US" dirty="0" err="1" smtClean="0"/>
+              <a:rPr lang="en-US" dirty="0"/>
+              <a:t> </a:t>
+            </a:r>
+            <a:r>
+              <a:rPr lang="en-US" dirty="0" err="1"/>
               <a:t>odskusanie</a:t>
             </a:r>
             <a:r>
-              <a:rPr lang="en-US" dirty="0" smtClean="0"/>
-              <a:t> </a:t>
-            </a:r>
-            <a:r>
-              <a:rPr lang="en-US" dirty="0" err="1" smtClean="0"/>
+              <a:rPr lang="en-US" dirty="0"/>
+              <a:t> </a:t>
+            </a:r>
+            <a:r>
+              <a:rPr lang="en-US" dirty="0" err="1"/>
               <a:t>si</a:t>
             </a:r>
             <a:r>
-              <a:rPr lang="en-US" dirty="0" smtClean="0"/>
+              <a:rPr lang="en-US" dirty="0"/>
               <a:t> (</a:t>
             </a:r>
             <a:r>
-              <a:rPr lang="en-US" dirty="0" err="1" smtClean="0"/>
+              <a:rPr lang="en-US" dirty="0" err="1"/>
               <a:t>odlabovanie</a:t>
             </a:r>
             <a:r>
-              <a:rPr lang="en-US" dirty="0" smtClean="0"/>
-              <a:t> </a:t>
-            </a:r>
-            <a:r>
-              <a:rPr lang="en-US" dirty="0" err="1" smtClean="0"/>
+              <a:rPr lang="en-US" dirty="0"/>
+              <a:t> </a:t>
+            </a:r>
+            <a:r>
+              <a:rPr lang="en-US" dirty="0" err="1"/>
               <a:t>nejakej</a:t>
             </a:r>
             <a:r>
-              <a:rPr lang="en-US" dirty="0" smtClean="0"/>
-              <a:t> </a:t>
-            </a:r>
-            <a:r>
-              <a:rPr lang="en-US" dirty="0" err="1" smtClean="0"/>
+              <a:rPr lang="en-US" dirty="0"/>
+              <a:t> </a:t>
+            </a:r>
+            <a:r>
+              <a:rPr lang="en-US" dirty="0" err="1"/>
               <a:t>implementacie</a:t>
             </a:r>
             <a:r>
-              <a:rPr lang="en-US" dirty="0" smtClean="0"/>
+              <a:rPr lang="en-US" dirty="0"/>
               <a:t>) a </a:t>
             </a:r>
             <a:r>
-              <a:rPr lang="en-US" dirty="0" err="1" smtClean="0"/>
+              <a:rPr lang="en-US" dirty="0" err="1"/>
               <a:t>az</a:t>
             </a:r>
             <a:r>
-              <a:rPr lang="en-US" dirty="0" smtClean="0"/>
-              <a:t> </a:t>
-            </a:r>
-            <a:r>
-              <a:rPr lang="en-US" dirty="0" err="1" smtClean="0"/>
+              <a:rPr lang="en-US" dirty="0"/>
+              <a:t> </a:t>
+            </a:r>
+            <a:r>
+              <a:rPr lang="en-US" dirty="0" err="1"/>
               <a:t>potom</a:t>
             </a:r>
             <a:r>
-              <a:rPr lang="en-US" dirty="0" smtClean="0"/>
-              <a:t> </a:t>
-            </a:r>
-            <a:r>
-              <a:rPr lang="en-US" dirty="0" err="1" smtClean="0"/>
+              <a:rPr lang="en-US" dirty="0"/>
+              <a:t> </a:t>
+            </a:r>
+            <a:r>
+              <a:rPr lang="en-US" dirty="0" err="1"/>
               <a:t>ju</a:t>
             </a:r>
             <a:r>
-              <a:rPr lang="en-US" dirty="0" smtClean="0"/>
-              <a:t> </a:t>
-            </a:r>
-            <a:r>
-              <a:rPr lang="en-US" dirty="0" err="1" smtClean="0"/>
+              <a:rPr lang="en-US" dirty="0"/>
+              <a:t> </a:t>
+            </a:r>
+            <a:r>
+              <a:rPr lang="en-US" dirty="0" err="1"/>
               <a:t>davam</a:t>
             </a:r>
             <a:r>
-              <a:rPr lang="en-US" dirty="0" smtClean="0"/>
+              <a:rPr lang="en-US" dirty="0"/>
               <a:t> do </a:t>
             </a:r>
             <a:r>
-              <a:rPr lang="en-US" dirty="0" err="1" smtClean="0"/>
+              <a:rPr lang="en-US" dirty="0" err="1"/>
               <a:t>modulov</a:t>
             </a:r>
             <a:r>
-              <a:rPr lang="en-US" dirty="0" smtClean="0"/>
+              <a:rPr lang="en-US" dirty="0"/>
               <a:t>. </a:t>
             </a:r>
             <a:r>
-              <a:rPr lang="en-US" dirty="0" err="1" smtClean="0"/>
+              <a:rPr lang="en-US" dirty="0" err="1"/>
               <a:t>Kodnite</a:t>
             </a:r>
             <a:r>
-              <a:rPr lang="en-US" dirty="0" smtClean="0"/>
-              <a:t> </a:t>
-            </a:r>
-            <a:r>
-              <a:rPr lang="en-US" dirty="0" err="1" smtClean="0"/>
+              <a:rPr lang="en-US" dirty="0"/>
+              <a:t> </a:t>
+            </a:r>
+            <a:r>
+              <a:rPr lang="en-US" dirty="0" err="1"/>
               <a:t>tieto</a:t>
             </a:r>
             <a:r>
-              <a:rPr lang="en-US" dirty="0" smtClean="0"/>
-              <a:t> </a:t>
-            </a:r>
-            <a:r>
-              <a:rPr lang="en-US" dirty="0" err="1" smtClean="0"/>
+              <a:rPr lang="en-US" dirty="0"/>
+              <a:t> </a:t>
+            </a:r>
+            <a:r>
+              <a:rPr lang="en-US" dirty="0" err="1"/>
               <a:t>dve</a:t>
             </a:r>
             <a:r>
-              <a:rPr lang="en-US" dirty="0" smtClean="0"/>
-              <a:t> </a:t>
-            </a:r>
-            <a:r>
-              <a:rPr lang="en-US" dirty="0" err="1" smtClean="0"/>
+              <a:rPr lang="en-US" dirty="0"/>
+              <a:t> </a:t>
+            </a:r>
+            <a:r>
+              <a:rPr lang="en-US" dirty="0" err="1"/>
               <a:t>metody</a:t>
             </a:r>
             <a:r>
-              <a:rPr lang="en-US" dirty="0" smtClean="0"/>
+              <a:rPr lang="en-US" dirty="0"/>
               <a:t>, </a:t>
             </a:r>
             <a:r>
-              <a:rPr lang="en-US" dirty="0" err="1" smtClean="0"/>
+              <a:rPr lang="en-US" dirty="0" err="1"/>
               <a:t>nech</a:t>
             </a:r>
             <a:r>
-              <a:rPr lang="en-US" dirty="0" smtClean="0"/>
-              <a:t> </a:t>
-            </a:r>
-            <a:r>
-              <a:rPr lang="en-US" dirty="0" err="1" smtClean="0"/>
+              <a:rPr lang="en-US" dirty="0"/>
+              <a:t> </a:t>
+            </a:r>
+            <a:r>
+              <a:rPr lang="en-US" dirty="0" err="1"/>
               <a:t>sme</a:t>
             </a:r>
             <a:r>
-              <a:rPr lang="en-US" dirty="0" smtClean="0"/>
-              <a:t> </a:t>
-            </a:r>
-            <a:r>
-              <a:rPr lang="en-US" dirty="0" err="1" smtClean="0"/>
+              <a:rPr lang="en-US" dirty="0"/>
+              <a:t> </a:t>
+            </a:r>
+            <a:r>
+              <a:rPr lang="en-US" dirty="0" err="1"/>
               <a:t>si</a:t>
             </a:r>
             <a:r>
-              <a:rPr lang="en-US" dirty="0" smtClean="0"/>
-              <a:t> </a:t>
-            </a:r>
-            <a:r>
-              <a:rPr lang="en-US" dirty="0" err="1" smtClean="0"/>
+              <a:rPr lang="en-US" dirty="0"/>
+              <a:t> </a:t>
+            </a:r>
+            <a:r>
+              <a:rPr lang="en-US" dirty="0" err="1"/>
               <a:t>isty</a:t>
             </a:r>
             <a:r>
-              <a:rPr lang="en-US" dirty="0" smtClean="0"/>
-              <a:t> </a:t>
-            </a:r>
-            <a:r>
-              <a:rPr lang="en-US" dirty="0" err="1" smtClean="0"/>
+              <a:rPr lang="en-US" dirty="0"/>
+              <a:t> </a:t>
+            </a:r>
+            <a:r>
+              <a:rPr lang="en-US" dirty="0" err="1"/>
               <a:t>ze</a:t>
             </a:r>
             <a:r>
-              <a:rPr lang="en-US" dirty="0" smtClean="0"/>
-              <a:t> </a:t>
-            </a:r>
-            <a:r>
-              <a:rPr lang="en-US" dirty="0" err="1" smtClean="0"/>
+              <a:rPr lang="en-US" dirty="0"/>
+              <a:t> </a:t>
+            </a:r>
+            <a:r>
+              <a:rPr lang="en-US" dirty="0" err="1"/>
               <a:t>chapete</a:t>
             </a:r>
             <a:r>
-              <a:rPr lang="en-US" dirty="0" smtClean="0"/>
+              <a:rPr lang="en-US" dirty="0"/>
               <a:t> equality </a:t>
             </a:r>
             <a:r>
-              <a:rPr lang="en-US" dirty="0" err="1" smtClean="0"/>
+              <a:rPr lang="en-US" dirty="0" err="1"/>
               <a:t>algoritmy</a:t>
             </a:r>
             <a:r>
-              <a:rPr lang="en-US" dirty="0" smtClean="0"/>
+              <a:rPr lang="en-US" dirty="0"/>
               <a:t> a </a:t>
             </a:r>
             <a:r>
-              <a:rPr lang="en-US" dirty="0" err="1" smtClean="0"/>
+              <a:rPr lang="en-US" dirty="0" err="1"/>
               <a:t>vytvaranie</a:t>
             </a:r>
             <a:r>
-              <a:rPr lang="en-US" dirty="0" smtClean="0"/>
-              <a:t> </a:t>
-            </a:r>
-            <a:r>
-              <a:rPr lang="en-US" dirty="0" err="1" smtClean="0"/>
+              <a:rPr lang="en-US" dirty="0"/>
+              <a:t> </a:t>
+            </a:r>
+            <a:r>
+              <a:rPr lang="en-US" dirty="0" err="1"/>
               <a:t>funkcii</a:t>
             </a:r>
             <a:r>
-              <a:rPr lang="en-US" dirty="0" smtClean="0"/>
+              <a:rPr lang="en-US" dirty="0"/>
               <a:t>.</a:t>
             </a:r>
             <a:endParaRPr lang="sk-SK" dirty="0"/>
@@ -3753,7 +3909,7 @@
 </p:sld>
 </file>
 
-<file path=ppt/slides/slide11.xml><?xml version="1.0" encoding="utf-8"?>
+<file path=ppt/slides/slide12.xml><?xml version="1.0" encoding="utf-8"?>
 <p:sld xmlns:a="http://schemas.openxmlformats.org/drawingml/2006/main" xmlns:r="http://schemas.openxmlformats.org/officeDocument/2006/relationships" xmlns:p="http://schemas.openxmlformats.org/presentationml/2006/main">
   <p:cSld>
     <p:spTree>
@@ -3786,15 +3942,15 @@
           <a:lstStyle/>
           <a:p>
             <a:r>
-              <a:rPr lang="en-US" dirty="0" err="1" smtClean="0"/>
+              <a:rPr lang="en-US" dirty="0" err="1"/>
               <a:t>Cvicenie</a:t>
             </a:r>
             <a:r>
-              <a:rPr lang="en-US" dirty="0" smtClean="0"/>
+              <a:rPr lang="en-US" dirty="0"/>
               <a:t> 2: </a:t>
             </a:r>
             <a:r>
-              <a:rPr lang="en-US" dirty="0" err="1" smtClean="0"/>
+              <a:rPr lang="en-US" dirty="0" err="1"/>
               <a:t>Bodovanie</a:t>
             </a:r>
             <a:endParaRPr lang="sk-SK" dirty="0"/>
@@ -3817,230 +3973,237 @@
           <a:lstStyle/>
           <a:p>
             <a:r>
-              <a:rPr lang="en-US" dirty="0" err="1" smtClean="0"/>
+              <a:rPr lang="en-US" dirty="0" err="1"/>
               <a:t>Priebezna</a:t>
             </a:r>
             <a:r>
-              <a:rPr lang="en-US" dirty="0" smtClean="0"/>
-              <a:t> </a:t>
-            </a:r>
-            <a:r>
-              <a:rPr lang="en-US" dirty="0" err="1" smtClean="0"/>
+              <a:rPr lang="en-US" dirty="0"/>
+              <a:t> </a:t>
+            </a:r>
+            <a:r>
+              <a:rPr lang="en-US" dirty="0" err="1"/>
               <a:t>kontrola</a:t>
             </a:r>
             <a:r>
-              <a:rPr lang="en-US" dirty="0" smtClean="0"/>
-              <a:t> </a:t>
-            </a:r>
-            <a:r>
-              <a:rPr lang="en-US" dirty="0" err="1" smtClean="0"/>
+              <a:rPr lang="en-US" dirty="0"/>
+              <a:t> </a:t>
+            </a:r>
+            <a:r>
+              <a:rPr lang="en-US" dirty="0" err="1"/>
               <a:t>prace</a:t>
             </a:r>
             <a:r>
-              <a:rPr lang="en-US" dirty="0" smtClean="0"/>
-              <a:t> </a:t>
-            </a:r>
-            <a:r>
-              <a:rPr lang="en-US" dirty="0" err="1" smtClean="0"/>
+              <a:rPr lang="en-US" dirty="0"/>
+              <a:t> </a:t>
+            </a:r>
+            <a:r>
+              <a:rPr lang="en-US" dirty="0" err="1"/>
               <a:t>studentov</a:t>
             </a:r>
             <a:r>
-              <a:rPr lang="en-US" dirty="0" smtClean="0"/>
-              <a:t> </a:t>
-            </a:r>
-            <a:r>
-              <a:rPr lang="en-US" dirty="0" err="1" smtClean="0"/>
+              <a:rPr lang="en-US" dirty="0"/>
+              <a:t> </a:t>
+            </a:r>
+            <a:r>
+              <a:rPr lang="en-US" dirty="0" err="1"/>
               <a:t>pocas</a:t>
             </a:r>
             <a:r>
-              <a:rPr lang="en-US" dirty="0" smtClean="0"/>
-              <a:t> </a:t>
-            </a:r>
-            <a:r>
-              <a:rPr lang="en-US" dirty="0" err="1" smtClean="0"/>
+              <a:rPr lang="en-US" dirty="0"/>
+              <a:t> </a:t>
+            </a:r>
+            <a:r>
+              <a:rPr lang="en-US" dirty="0" err="1"/>
               <a:t>cvika</a:t>
             </a:r>
-            <a:endParaRPr lang="en-US" dirty="0" smtClean="0"/>
-          </a:p>
-          <a:p>
-            <a:r>
-              <a:rPr lang="en-US" dirty="0" err="1" smtClean="0"/>
+            <a:endParaRPr lang="en-US" dirty="0"/>
+          </a:p>
+          <a:p>
+            <a:r>
+              <a:rPr lang="en-US" dirty="0" err="1"/>
               <a:t>Kratka</a:t>
             </a:r>
             <a:r>
-              <a:rPr lang="en-US" dirty="0" smtClean="0"/>
-              <a:t> </a:t>
-            </a:r>
-            <a:r>
-              <a:rPr lang="en-US" dirty="0" err="1" smtClean="0"/>
+              <a:rPr lang="en-US" dirty="0"/>
+              <a:t> </a:t>
+            </a:r>
+            <a:r>
+              <a:rPr lang="en-US" dirty="0" err="1"/>
               <a:t>kontrola</a:t>
             </a:r>
             <a:r>
-              <a:rPr lang="en-US" dirty="0" smtClean="0"/>
-              <a:t> </a:t>
-            </a:r>
-            <a:r>
-              <a:rPr lang="en-US" dirty="0" err="1" smtClean="0"/>
+              <a:rPr lang="en-US" dirty="0"/>
+              <a:t> </a:t>
+            </a:r>
+            <a:r>
+              <a:rPr lang="en-US" dirty="0" err="1"/>
               <a:t>toho</a:t>
             </a:r>
             <a:r>
-              <a:rPr lang="en-US" dirty="0" smtClean="0"/>
-              <a:t> </a:t>
-            </a:r>
-            <a:r>
-              <a:rPr lang="en-US" dirty="0" err="1" smtClean="0"/>
+              <a:rPr lang="en-US" dirty="0"/>
+              <a:t> </a:t>
+            </a:r>
+            <a:r>
+              <a:rPr lang="en-US" dirty="0" err="1"/>
               <a:t>kto</a:t>
             </a:r>
             <a:r>
-              <a:rPr lang="en-US" dirty="0" smtClean="0"/>
+              <a:rPr lang="en-US" dirty="0"/>
               <a:t> co </a:t>
             </a:r>
             <a:r>
-              <a:rPr lang="en-US" dirty="0" err="1" smtClean="0"/>
+              <a:rPr lang="en-US" dirty="0" err="1"/>
               <a:t>spravil</a:t>
             </a:r>
             <a:r>
-              <a:rPr lang="en-US" dirty="0" smtClean="0"/>
+              <a:rPr lang="en-US" dirty="0"/>
               <a:t>, </a:t>
             </a:r>
           </a:p>
           <a:p>
             <a:pPr lvl="1"/>
             <a:r>
-              <a:rPr lang="en-US" dirty="0" err="1" smtClean="0"/>
+              <a:rPr lang="en-US" dirty="0" err="1"/>
               <a:t>bodovanie</a:t>
             </a:r>
             <a:r>
-              <a:rPr lang="en-US" dirty="0" smtClean="0"/>
+              <a:rPr lang="en-US" dirty="0"/>
               <a:t> 1-3 body, </a:t>
             </a:r>
           </a:p>
           <a:p>
             <a:pPr lvl="1"/>
             <a:r>
-              <a:rPr lang="en-US" dirty="0" err="1" smtClean="0"/>
+              <a:rPr lang="en-US" dirty="0"/>
+              <a:t>+ 2 body za implementaciu indexOf z equality prikladu (na cviku)</a:t>
+            </a:r>
+          </a:p>
+          <a:p>
+            <a:pPr lvl="1"/>
+            <a:r>
+              <a:rPr lang="en-US" dirty="0" err="1"/>
               <a:t>za</a:t>
             </a:r>
             <a:r>
-              <a:rPr lang="en-US" dirty="0" smtClean="0"/>
-              <a:t> </a:t>
-            </a:r>
-            <a:r>
-              <a:rPr lang="en-US" dirty="0" err="1" smtClean="0"/>
+              <a:rPr lang="en-US" dirty="0"/>
+              <a:t> </a:t>
+            </a:r>
+            <a:r>
+              <a:rPr lang="en-US" dirty="0" err="1"/>
               <a:t>neucast</a:t>
             </a:r>
             <a:r>
-              <a:rPr lang="en-US" dirty="0" smtClean="0"/>
+              <a:rPr lang="en-US" dirty="0"/>
               <a:t> 0 </a:t>
             </a:r>
             <a:r>
-              <a:rPr lang="en-US" dirty="0" err="1" smtClean="0"/>
+              <a:rPr lang="en-US" dirty="0" err="1"/>
               <a:t>bodov</a:t>
             </a:r>
-            <a:endParaRPr lang="en-US" dirty="0" smtClean="0"/>
-          </a:p>
-          <a:p>
-            <a:r>
-              <a:rPr lang="en-US" dirty="0" err="1" smtClean="0"/>
+            <a:endParaRPr lang="en-US" dirty="0"/>
+          </a:p>
+          <a:p>
+            <a:r>
+              <a:rPr lang="en-US" dirty="0" err="1"/>
               <a:t>Bonusove</a:t>
             </a:r>
             <a:r>
-              <a:rPr lang="en-US" dirty="0" smtClean="0"/>
+              <a:rPr lang="en-US" dirty="0"/>
               <a:t> body: </a:t>
             </a:r>
             <a:r>
-              <a:rPr lang="en-US" dirty="0" err="1" smtClean="0"/>
+              <a:rPr lang="en-US" dirty="0" err="1"/>
               <a:t>za</a:t>
             </a:r>
             <a:r>
-              <a:rPr lang="en-US" dirty="0" smtClean="0"/>
-              <a:t> </a:t>
-            </a:r>
-            <a:r>
-              <a:rPr lang="en-US" dirty="0" err="1" smtClean="0"/>
-              <a:t>vinimocnu</a:t>
-            </a:r>
-            <a:r>
-              <a:rPr lang="en-US" dirty="0" smtClean="0"/>
-              <a:t> </a:t>
-            </a:r>
-            <a:r>
-              <a:rPr lang="en-US" dirty="0" err="1" smtClean="0"/>
+              <a:rPr lang="en-US" dirty="0"/>
+              <a:t> </a:t>
+            </a:r>
+            <a:r>
+              <a:rPr lang="en-US" dirty="0" err="1"/>
+              <a:t>vynimocnu</a:t>
+            </a:r>
+            <a:r>
+              <a:rPr lang="en-US" dirty="0"/>
+              <a:t> </a:t>
+            </a:r>
+            <a:r>
+              <a:rPr lang="en-US" dirty="0" err="1"/>
               <a:t>aktivitu</a:t>
             </a:r>
             <a:r>
-              <a:rPr lang="en-US" dirty="0" smtClean="0"/>
-              <a:t> </a:t>
-            </a:r>
-            <a:r>
-              <a:rPr lang="en-US" dirty="0" err="1" smtClean="0"/>
+              <a:rPr lang="en-US" dirty="0"/>
+              <a:t> </a:t>
+            </a:r>
+            <a:r>
+              <a:rPr lang="en-US" dirty="0" err="1"/>
               <a:t>alebo</a:t>
             </a:r>
             <a:r>
-              <a:rPr lang="en-US" dirty="0" smtClean="0"/>
-              <a:t> </a:t>
-            </a:r>
-            <a:r>
-              <a:rPr lang="en-US" dirty="0" err="1" smtClean="0"/>
+              <a:rPr lang="en-US" dirty="0"/>
+              <a:t> </a:t>
+            </a:r>
+            <a:r>
+              <a:rPr lang="en-US" dirty="0" err="1"/>
               <a:t>dobre</a:t>
             </a:r>
             <a:r>
-              <a:rPr lang="en-US" dirty="0" smtClean="0"/>
-              <a:t> </a:t>
-            </a:r>
-            <a:r>
-              <a:rPr lang="en-US" dirty="0" err="1" smtClean="0"/>
+              <a:rPr lang="en-US" dirty="0"/>
+              <a:t> </a:t>
+            </a:r>
+            <a:r>
+              <a:rPr lang="en-US" dirty="0" err="1"/>
               <a:t>napady</a:t>
             </a:r>
             <a:r>
-              <a:rPr lang="en-US" dirty="0" smtClean="0"/>
+              <a:rPr lang="en-US" dirty="0"/>
               <a:t> 1 bonus bod </a:t>
             </a:r>
             <a:r>
-              <a:rPr lang="en-US" dirty="0" err="1" smtClean="0"/>
+              <a:rPr lang="en-US" dirty="0" err="1"/>
               <a:t>studentovi</a:t>
             </a:r>
-            <a:endParaRPr lang="en-US" dirty="0" smtClean="0"/>
-          </a:p>
-          <a:p>
-            <a:r>
-              <a:rPr lang="en-US" dirty="0" err="1" smtClean="0"/>
+            <a:endParaRPr lang="en-US" dirty="0"/>
+          </a:p>
+          <a:p>
+            <a:r>
+              <a:rPr lang="en-US" dirty="0" err="1"/>
               <a:t>Bonusove</a:t>
             </a:r>
             <a:r>
-              <a:rPr lang="en-US" dirty="0" smtClean="0"/>
+              <a:rPr lang="en-US" dirty="0"/>
               <a:t> body </a:t>
             </a:r>
             <a:r>
-              <a:rPr lang="en-US" dirty="0" err="1" smtClean="0"/>
+              <a:rPr lang="en-US" dirty="0" err="1"/>
               <a:t>za</a:t>
             </a:r>
             <a:r>
-              <a:rPr lang="en-US" dirty="0" smtClean="0"/>
+              <a:rPr lang="en-US" dirty="0"/>
               <a:t> “</a:t>
             </a:r>
             <a:r>
-              <a:rPr lang="en-US" dirty="0" err="1" smtClean="0"/>
+              <a:rPr lang="en-US" dirty="0" err="1"/>
               <a:t>wawjs</a:t>
             </a:r>
             <a:r>
-              <a:rPr lang="en-US" dirty="0" smtClean="0"/>
+              <a:rPr lang="en-US" dirty="0"/>
               <a:t> repo contributions” (</a:t>
             </a:r>
             <a:r>
-              <a:rPr lang="en-US" dirty="0" err="1" smtClean="0"/>
+              <a:rPr lang="en-US" dirty="0" err="1"/>
               <a:t>zatial</a:t>
             </a:r>
             <a:r>
-              <a:rPr lang="en-US" dirty="0" smtClean="0"/>
+              <a:rPr lang="en-US" dirty="0"/>
               <a:t> 0 </a:t>
             </a:r>
             <a:r>
-              <a:rPr lang="en-US" dirty="0" err="1" smtClean="0"/>
+              <a:rPr lang="en-US" dirty="0" err="1"/>
               <a:t>ludi</a:t>
             </a:r>
             <a:r>
-              <a:rPr lang="en-US" dirty="0" smtClean="0"/>
+              <a:rPr lang="en-US" dirty="0"/>
               <a:t>)</a:t>
             </a:r>
           </a:p>
@@ -4048,7 +4211,7 @@
             <a:pPr marL="0" indent="0">
               <a:buNone/>
             </a:pPr>
-            <a:endParaRPr lang="en-US" dirty="0" smtClean="0"/>
+            <a:endParaRPr lang="en-US" dirty="0"/>
           </a:p>
           <a:p>
             <a:endParaRPr lang="sk-SK" dirty="0"/>
@@ -4101,7 +4264,7 @@
           <a:lstStyle/>
           <a:p>
             <a:r>
-              <a:rPr lang="en-US" dirty="0" smtClean="0"/>
+              <a:rPr lang="en-US" dirty="0"/>
               <a:t>Program</a:t>
             </a:r>
             <a:endParaRPr lang="sk-SK" dirty="0"/>
@@ -4124,207 +4287,207 @@
           <a:lstStyle/>
           <a:p>
             <a:r>
-              <a:rPr lang="en-US" dirty="0" err="1" smtClean="0"/>
+              <a:rPr lang="en-US" dirty="0" err="1"/>
               <a:t>Prezencka</a:t>
             </a:r>
             <a:r>
-              <a:rPr lang="en-US" dirty="0" smtClean="0"/>
+              <a:rPr lang="en-US" dirty="0"/>
               <a:t> a </a:t>
             </a:r>
             <a:r>
-              <a:rPr lang="en-US" dirty="0" err="1" smtClean="0"/>
+              <a:rPr lang="en-US" dirty="0" err="1"/>
               <a:t>zaznacenie</a:t>
             </a:r>
             <a:r>
-              <a:rPr lang="en-US" dirty="0" smtClean="0"/>
+              <a:rPr lang="en-US" dirty="0"/>
               <a:t> do </a:t>
             </a:r>
             <a:r>
-              <a:rPr lang="en-US" dirty="0" err="1" smtClean="0"/>
+              <a:rPr lang="en-US" dirty="0" err="1"/>
               <a:t>AISu</a:t>
             </a:r>
-            <a:endParaRPr lang="en-US" dirty="0" smtClean="0"/>
-          </a:p>
-          <a:p>
-            <a:r>
-              <a:rPr lang="en-US" dirty="0" err="1" smtClean="0"/>
+            <a:endParaRPr lang="en-US" dirty="0"/>
+          </a:p>
+          <a:p>
+            <a:r>
+              <a:rPr lang="en-US" dirty="0" err="1"/>
               <a:t>Kontrola</a:t>
             </a:r>
             <a:r>
-              <a:rPr lang="en-US" dirty="0" smtClean="0"/>
-              <a:t> </a:t>
-            </a:r>
-            <a:r>
-              <a:rPr lang="en-US" dirty="0" err="1" smtClean="0"/>
+              <a:rPr lang="en-US" dirty="0"/>
+              <a:t> </a:t>
+            </a:r>
+            <a:r>
+              <a:rPr lang="en-US" dirty="0" err="1"/>
               <a:t>instalacii</a:t>
             </a:r>
             <a:r>
-              <a:rPr lang="en-US" dirty="0" smtClean="0"/>
+              <a:rPr lang="en-US" dirty="0"/>
               <a:t> z </a:t>
             </a:r>
             <a:r>
-              <a:rPr lang="en-US" dirty="0" err="1" smtClean="0"/>
+              <a:rPr lang="en-US" dirty="0" err="1"/>
               <a:t>minulej</a:t>
             </a:r>
             <a:r>
-              <a:rPr lang="en-US" dirty="0" smtClean="0"/>
-              <a:t> </a:t>
-            </a:r>
-            <a:r>
-              <a:rPr lang="en-US" dirty="0" err="1" smtClean="0"/>
+              <a:rPr lang="en-US" dirty="0"/>
+              <a:t> </a:t>
+            </a:r>
+            <a:r>
+              <a:rPr lang="en-US" dirty="0" err="1"/>
               <a:t>prednasky</a:t>
             </a:r>
             <a:r>
-              <a:rPr lang="en-US" dirty="0" smtClean="0"/>
+              <a:rPr lang="en-US" dirty="0"/>
               <a:t> (</a:t>
             </a:r>
             <a:r>
-              <a:rPr lang="en-US" dirty="0" err="1" smtClean="0"/>
+              <a:rPr lang="en-US" dirty="0" err="1"/>
               <a:t>kto</a:t>
             </a:r>
             <a:r>
-              <a:rPr lang="en-US" dirty="0" smtClean="0"/>
-              <a:t> </a:t>
-            </a:r>
-            <a:r>
-              <a:rPr lang="en-US" dirty="0" err="1" smtClean="0"/>
+              <a:rPr lang="en-US" dirty="0"/>
+              <a:t> </a:t>
+            </a:r>
+            <a:r>
+              <a:rPr lang="en-US" dirty="0" err="1"/>
               <a:t>nema</a:t>
             </a:r>
             <a:r>
-              <a:rPr lang="en-US" dirty="0" smtClean="0"/>
-              <a:t> </a:t>
-            </a:r>
-            <a:r>
-              <a:rPr lang="en-US" dirty="0" err="1" smtClean="0"/>
+              <a:rPr lang="en-US" dirty="0"/>
+              <a:t> </a:t>
+            </a:r>
+            <a:r>
+              <a:rPr lang="en-US" dirty="0" err="1"/>
               <a:t>dokoncenie</a:t>
             </a:r>
             <a:r>
-              <a:rPr lang="en-US" dirty="0" smtClean="0"/>
-              <a:t> </a:t>
-            </a:r>
-            <a:r>
-              <a:rPr lang="en-US" dirty="0" err="1" smtClean="0"/>
+              <a:rPr lang="en-US" dirty="0"/>
+              <a:t> </a:t>
+            </a:r>
+            <a:r>
+              <a:rPr lang="en-US" dirty="0" err="1"/>
               <a:t>na</a:t>
             </a:r>
             <a:r>
-              <a:rPr lang="en-US" dirty="0" smtClean="0"/>
-              <a:t> </a:t>
-            </a:r>
-            <a:r>
-              <a:rPr lang="en-US" dirty="0" err="1" smtClean="0"/>
+              <a:rPr lang="en-US" dirty="0"/>
+              <a:t> </a:t>
+            </a:r>
+            <a:r>
+              <a:rPr lang="en-US" dirty="0" err="1"/>
               <a:t>cviku</a:t>
             </a:r>
             <a:r>
-              <a:rPr lang="en-US" dirty="0" smtClean="0"/>
+              <a:rPr lang="en-US" dirty="0"/>
               <a:t>)</a:t>
             </a:r>
           </a:p>
           <a:p>
             <a:r>
-              <a:rPr lang="en-US" b="1" dirty="0" err="1" smtClean="0"/>
+              <a:rPr lang="en-US" b="1" dirty="0" err="1"/>
               <a:t>Riesenie</a:t>
             </a:r>
             <a:r>
-              <a:rPr lang="en-US" b="1" dirty="0" smtClean="0"/>
-              <a:t> </a:t>
-            </a:r>
-            <a:r>
-              <a:rPr lang="en-US" b="1" dirty="0" err="1" smtClean="0"/>
+              <a:rPr lang="en-US" b="1" dirty="0"/>
+              <a:t> </a:t>
+            </a:r>
+            <a:r>
+              <a:rPr lang="en-US" b="1" dirty="0" err="1"/>
               <a:t>zadania</a:t>
             </a:r>
             <a:r>
-              <a:rPr lang="en-US" b="1" dirty="0" smtClean="0"/>
-              <a:t> </a:t>
-            </a:r>
-            <a:r>
-              <a:rPr lang="en-US" dirty="0" smtClean="0"/>
+              <a:rPr lang="en-US" b="1" dirty="0"/>
+              <a:t> </a:t>
+            </a:r>
+            <a:r>
+              <a:rPr lang="en-US" dirty="0"/>
               <a:t>(</a:t>
             </a:r>
             <a:r>
-              <a:rPr lang="en-US" dirty="0" err="1" smtClean="0"/>
+              <a:rPr lang="en-US" dirty="0" err="1"/>
               <a:t>priamo</a:t>
             </a:r>
             <a:r>
-              <a:rPr lang="en-US" dirty="0" smtClean="0"/>
-              <a:t> </a:t>
-            </a:r>
-            <a:r>
-              <a:rPr lang="en-US" dirty="0" err="1" smtClean="0"/>
+              <a:rPr lang="en-US" dirty="0"/>
+              <a:t> </a:t>
+            </a:r>
+            <a:r>
+              <a:rPr lang="en-US" dirty="0" err="1"/>
               <a:t>na</a:t>
             </a:r>
             <a:r>
-              <a:rPr lang="en-US" dirty="0" smtClean="0"/>
-              <a:t> </a:t>
-            </a:r>
-            <a:r>
-              <a:rPr lang="en-US" dirty="0" err="1" smtClean="0"/>
+              <a:rPr lang="en-US" dirty="0"/>
+              <a:t> </a:t>
+            </a:r>
+            <a:r>
+              <a:rPr lang="en-US" dirty="0" err="1"/>
               <a:t>zviku</a:t>
             </a:r>
             <a:r>
-              <a:rPr lang="en-US" dirty="0" smtClean="0"/>
+              <a:rPr lang="en-US" dirty="0"/>
               <a:t>)</a:t>
             </a:r>
           </a:p>
           <a:p>
             <a:r>
-              <a:rPr lang="en-US" dirty="0" err="1" smtClean="0"/>
+              <a:rPr lang="en-US" dirty="0" err="1"/>
               <a:t>Konzultacie</a:t>
             </a:r>
             <a:r>
-              <a:rPr lang="en-US" dirty="0" smtClean="0"/>
+              <a:rPr lang="en-US" dirty="0"/>
               <a:t> k </a:t>
             </a:r>
             <a:r>
-              <a:rPr lang="en-US" dirty="0" err="1" smtClean="0"/>
+              <a:rPr lang="en-US" dirty="0" err="1"/>
               <a:t>zadaniu</a:t>
             </a:r>
             <a:r>
-              <a:rPr lang="en-US" dirty="0" smtClean="0"/>
+              <a:rPr lang="en-US" dirty="0"/>
               <a:t> 1 (review </a:t>
             </a:r>
             <a:r>
-              <a:rPr lang="en-US" dirty="0" err="1" smtClean="0"/>
+              <a:rPr lang="en-US" dirty="0" err="1"/>
               <a:t>projektov</a:t>
             </a:r>
             <a:r>
-              <a:rPr lang="en-US" dirty="0" smtClean="0"/>
+              <a:rPr lang="en-US" dirty="0"/>
               <a:t>, </a:t>
             </a:r>
             <a:r>
-              <a:rPr lang="en-US" dirty="0" err="1" smtClean="0"/>
+              <a:rPr lang="en-US" dirty="0" err="1"/>
               <a:t>zatial</a:t>
             </a:r>
             <a:r>
-              <a:rPr lang="en-US" dirty="0" smtClean="0"/>
-              <a:t> </a:t>
-            </a:r>
-            <a:r>
-              <a:rPr lang="en-US" dirty="0" err="1" smtClean="0"/>
+              <a:rPr lang="en-US" dirty="0"/>
+              <a:t> </a:t>
+            </a:r>
+            <a:r>
+              <a:rPr lang="en-US" dirty="0" err="1"/>
               <a:t>zaslali</a:t>
             </a:r>
             <a:r>
-              <a:rPr lang="en-US" dirty="0" smtClean="0"/>
+              <a:rPr lang="en-US" dirty="0"/>
               <a:t> 2ja </a:t>
             </a:r>
             <a:r>
-              <a:rPr lang="en-US" dirty="0" err="1" smtClean="0"/>
+              <a:rPr lang="en-US" dirty="0" err="1"/>
               <a:t>ludia</a:t>
             </a:r>
             <a:r>
-              <a:rPr lang="en-US" dirty="0" smtClean="0"/>
-              <a:t> </a:t>
-            </a:r>
-            <a:r>
-              <a:rPr lang="en-US" dirty="0" err="1" smtClean="0"/>
+              <a:rPr lang="en-US" dirty="0"/>
+              <a:t> </a:t>
+            </a:r>
+            <a:r>
+              <a:rPr lang="en-US" dirty="0" err="1"/>
               <a:t>mailom</a:t>
             </a:r>
             <a:r>
-              <a:rPr lang="en-US" dirty="0" smtClean="0"/>
+              <a:rPr lang="en-US" dirty="0"/>
               <a:t>)</a:t>
             </a:r>
           </a:p>
           <a:p>
-            <a:endParaRPr lang="en-US" dirty="0" smtClean="0"/>
+            <a:endParaRPr lang="en-US" dirty="0"/>
           </a:p>
           <a:p>
             <a:endParaRPr lang="sk-SK" dirty="0"/>
@@ -4366,7 +4529,7 @@
           <p:cNvPr id="2" name="Title 1">
             <a:extLst>
               <a:ext uri="{FF2B5EF4-FFF2-40B4-BE49-F238E27FC236}">
-                <a16:creationId xmlns:a16="http://schemas.microsoft.com/office/drawing/2014/main" xmlns="" id="{D3E23D1A-22DE-D94B-A7F2-65583054D1CD}"/>
+                <a16:creationId xmlns:a16="http://schemas.microsoft.com/office/drawing/2014/main" id="{D3E23D1A-22DE-D94B-A7F2-65583054D1CD}"/>
               </a:ext>
             </a:extLst>
           </p:cNvPr>
@@ -4383,11 +4546,11 @@
           <a:lstStyle/>
           <a:p>
             <a:r>
-              <a:rPr lang="sk-SK" dirty="0" smtClean="0"/>
+              <a:rPr lang="sk-SK" dirty="0"/>
               <a:t>Check</a:t>
             </a:r>
             <a:r>
-              <a:rPr lang="en-US" dirty="0" smtClean="0"/>
+              <a:rPr lang="en-US" dirty="0"/>
               <a:t>s</a:t>
             </a:r>
             <a:endParaRPr lang="sk-SK" dirty="0"/>
@@ -4399,7 +4562,7 @@
           <p:cNvPr id="3" name="Content Placeholder 2">
             <a:extLst>
               <a:ext uri="{FF2B5EF4-FFF2-40B4-BE49-F238E27FC236}">
-                <a16:creationId xmlns:a16="http://schemas.microsoft.com/office/drawing/2014/main" xmlns="" id="{863E31C9-ACE5-2342-AD2B-7A90D3F92C9F}"/>
+                <a16:creationId xmlns:a16="http://schemas.microsoft.com/office/drawing/2014/main" id="{863E31C9-ACE5-2342-AD2B-7A90D3F92C9F}"/>
               </a:ext>
             </a:extLst>
           </p:cNvPr>
@@ -4440,22 +4603,18 @@
           <a:p>
             <a:r>
               <a:rPr lang="sk-SK" dirty="0"/>
-              <a:t>budu pribudat dalsie </a:t>
-            </a:r>
-            <a:r>
-              <a:rPr lang="sk-SK" dirty="0" smtClean="0"/>
-              <a:t>projektiky</a:t>
-            </a:r>
-            <a:r>
-              <a:rPr lang="en-US" dirty="0" smtClean="0"/>
-              <a:t> </a:t>
-            </a:r>
-            <a:r>
-              <a:rPr lang="en-US" dirty="0" err="1" smtClean="0"/>
+              <a:t>budu pribudat dalsie projektiky</a:t>
+            </a:r>
+            <a:r>
+              <a:rPr lang="en-US" dirty="0"/>
+              <a:t> </a:t>
+            </a:r>
+            <a:r>
+              <a:rPr lang="en-US" dirty="0" err="1"/>
               <a:t>wawjs</a:t>
             </a:r>
             <a:r>
-              <a:rPr lang="en-US" dirty="0" smtClean="0"/>
+              <a:rPr lang="en-US" dirty="0"/>
               <a:t>-*</a:t>
             </a:r>
             <a:endParaRPr lang="sk-SK" dirty="0"/>
@@ -4463,10 +4622,10 @@
           <a:p>
             <a:pPr lvl="1"/>
             <a:r>
-              <a:rPr lang="sk-SK" dirty="0" smtClean="0"/>
+              <a:rPr lang="sk-SK" dirty="0"/>
               <a:t>....</a:t>
             </a:r>
-            <a:endParaRPr lang="en-US" dirty="0" smtClean="0"/>
+            <a:endParaRPr lang="en-US" dirty="0"/>
           </a:p>
           <a:p>
             <a:pPr lvl="1"/>
@@ -4474,11 +4633,11 @@
           </a:p>
           <a:p>
             <a:r>
-              <a:rPr lang="en-US" dirty="0" smtClean="0"/>
+              <a:rPr lang="en-US" dirty="0"/>
               <a:t>node, </a:t>
             </a:r>
             <a:r>
-              <a:rPr lang="en-US" dirty="0" err="1" smtClean="0"/>
+              <a:rPr lang="en-US" dirty="0" err="1"/>
               <a:t>npm</a:t>
             </a:r>
             <a:r>
@@ -4486,80 +4645,80 @@
               <a:t> </a:t>
             </a:r>
             <a:r>
-              <a:rPr lang="en-US" dirty="0" err="1" smtClean="0"/>
+              <a:rPr lang="en-US" dirty="0" err="1"/>
               <a:t>verzie</a:t>
             </a:r>
             <a:r>
-              <a:rPr lang="en-US" dirty="0" smtClean="0"/>
+              <a:rPr lang="en-US" dirty="0"/>
               <a:t> ?</a:t>
             </a:r>
           </a:p>
           <a:p>
             <a:r>
-              <a:rPr lang="en-US" dirty="0" smtClean="0"/>
+              <a:rPr lang="en-US" dirty="0"/>
               <a:t>bash </a:t>
             </a:r>
             <a:r>
-              <a:rPr lang="en-US" dirty="0" err="1" smtClean="0"/>
+              <a:rPr lang="en-US" dirty="0" err="1"/>
               <a:t>konzola</a:t>
             </a:r>
             <a:r>
-              <a:rPr lang="en-US" dirty="0" smtClean="0"/>
+              <a:rPr lang="en-US" dirty="0"/>
               <a:t> (</a:t>
             </a:r>
             <a:r>
-              <a:rPr lang="en-US" dirty="0" err="1" smtClean="0"/>
+              <a:rPr lang="en-US" dirty="0" err="1"/>
               <a:t>aj</a:t>
             </a:r>
             <a:r>
-              <a:rPr lang="en-US" dirty="0" smtClean="0"/>
-              <a:t> </a:t>
-            </a:r>
-            <a:r>
-              <a:rPr lang="en-US" dirty="0" err="1" smtClean="0"/>
+              <a:rPr lang="en-US" dirty="0"/>
+              <a:t> </a:t>
+            </a:r>
+            <a:r>
+              <a:rPr lang="en-US" dirty="0" err="1"/>
               <a:t>na</a:t>
             </a:r>
             <a:r>
-              <a:rPr lang="en-US" dirty="0" smtClean="0"/>
-              <a:t> </a:t>
-            </a:r>
-            <a:r>
-              <a:rPr lang="en-US" dirty="0" err="1" smtClean="0"/>
+              <a:rPr lang="en-US" dirty="0"/>
+              <a:t> </a:t>
+            </a:r>
+            <a:r>
+              <a:rPr lang="en-US" dirty="0" err="1"/>
               <a:t>winsoch</a:t>
             </a:r>
             <a:r>
-              <a:rPr lang="en-US" dirty="0" smtClean="0"/>
-              <a:t> </a:t>
-            </a:r>
-            <a:r>
-              <a:rPr lang="en-US" dirty="0" err="1" smtClean="0"/>
+              <a:rPr lang="en-US" dirty="0"/>
+              <a:t> </a:t>
+            </a:r>
+            <a:r>
+              <a:rPr lang="en-US" dirty="0" err="1"/>
               <a:t>funkcna</a:t>
             </a:r>
             <a:r>
-              <a:rPr lang="en-US" dirty="0" smtClean="0"/>
+              <a:rPr lang="en-US" dirty="0"/>
               <a:t>)</a:t>
             </a:r>
           </a:p>
           <a:p>
             <a:r>
-              <a:rPr lang="en-US" dirty="0" err="1" smtClean="0"/>
+              <a:rPr lang="en-US" dirty="0" err="1"/>
               <a:t>github</a:t>
             </a:r>
             <a:r>
-              <a:rPr lang="en-US" dirty="0" smtClean="0"/>
+              <a:rPr lang="en-US" dirty="0"/>
               <a:t> account </a:t>
             </a:r>
             <a:r>
-              <a:rPr lang="en-US" dirty="0" err="1" smtClean="0"/>
+              <a:rPr lang="en-US" dirty="0" err="1"/>
               <a:t>funkcny</a:t>
             </a:r>
             <a:r>
-              <a:rPr lang="en-US" dirty="0" smtClean="0"/>
+              <a:rPr lang="en-US" dirty="0"/>
               <a:t> ?</a:t>
             </a:r>
           </a:p>
           <a:p>
-            <a:endParaRPr lang="en-US" dirty="0" smtClean="0"/>
+            <a:endParaRPr lang="en-US" dirty="0"/>
           </a:p>
           <a:p>
             <a:endParaRPr lang="sk-SK" dirty="0"/>
@@ -4601,7 +4760,7 @@
           <p:cNvPr id="2" name="Title 1">
             <a:extLst>
               <a:ext uri="{FF2B5EF4-FFF2-40B4-BE49-F238E27FC236}">
-                <a16:creationId xmlns:a16="http://schemas.microsoft.com/office/drawing/2014/main" xmlns="" id="{F4B92C5B-C7EB-FB43-9083-B267BF032993}"/>
+                <a16:creationId xmlns:a16="http://schemas.microsoft.com/office/drawing/2014/main" id="{F4B92C5B-C7EB-FB43-9083-B267BF032993}"/>
               </a:ext>
             </a:extLst>
           </p:cNvPr>
@@ -4618,23 +4777,23 @@
           <a:lstStyle/>
           <a:p>
             <a:r>
-              <a:rPr lang="en-US" dirty="0" err="1" smtClean="0"/>
+              <a:rPr lang="en-US" dirty="0" err="1"/>
               <a:t>Zadanie</a:t>
             </a:r>
             <a:r>
-              <a:rPr lang="en-US" dirty="0" smtClean="0"/>
+              <a:rPr lang="en-US" dirty="0"/>
               <a:t> 2: </a:t>
             </a:r>
             <a:r>
-              <a:rPr lang="en-US" dirty="0" err="1" smtClean="0"/>
+              <a:rPr lang="en-US" dirty="0" err="1"/>
               <a:t>Prvy</a:t>
             </a:r>
             <a:r>
-              <a:rPr lang="en-US" dirty="0" smtClean="0"/>
+              <a:rPr lang="en-US" dirty="0"/>
               <a:t> node </a:t>
             </a:r>
             <a:r>
-              <a:rPr lang="en-US" dirty="0" err="1" smtClean="0"/>
+              <a:rPr lang="en-US" dirty="0" err="1"/>
               <a:t>projekt</a:t>
             </a:r>
             <a:endParaRPr lang="sk-SK" dirty="0"/>
@@ -4646,7 +4805,7 @@
           <p:cNvPr id="3" name="Content Placeholder 2">
             <a:extLst>
               <a:ext uri="{FF2B5EF4-FFF2-40B4-BE49-F238E27FC236}">
-                <a16:creationId xmlns:a16="http://schemas.microsoft.com/office/drawing/2014/main" xmlns="" id="{83748280-D317-7F4C-B91E-EB2311FA61A9}"/>
+                <a16:creationId xmlns:a16="http://schemas.microsoft.com/office/drawing/2014/main" id="{83748280-D317-7F4C-B91E-EB2311FA61A9}"/>
               </a:ext>
             </a:extLst>
           </p:cNvPr>
@@ -4665,12 +4824,8 @@
           <a:lstStyle/>
           <a:p>
             <a:r>
-              <a:rPr lang="sk-SK" dirty="0" smtClean="0"/>
-              <a:t>npm </a:t>
-            </a:r>
-            <a:r>
               <a:rPr lang="sk-SK" dirty="0"/>
-              <a:t>init</a:t>
+              <a:t>npm init</a:t>
             </a:r>
           </a:p>
           <a:p>
@@ -4703,71 +4858,62 @@
           </a:p>
           <a:p>
             <a:r>
-              <a:rPr lang="en-US" dirty="0" smtClean="0"/>
+              <a:rPr lang="en-US" dirty="0"/>
               <a:t>testy</a:t>
             </a:r>
           </a:p>
           <a:p>
             <a:pPr lvl="1"/>
             <a:r>
-              <a:rPr lang="en-US" dirty="0" smtClean="0"/>
+              <a:rPr lang="en-US" dirty="0"/>
               <a:t>mocha (</a:t>
             </a:r>
             <a:r>
-              <a:rPr lang="en-US" dirty="0" err="1" smtClean="0"/>
+              <a:rPr lang="en-US" dirty="0" err="1"/>
               <a:t>npm</a:t>
             </a:r>
             <a:r>
-              <a:rPr lang="en-US" dirty="0" smtClean="0"/>
+              <a:rPr lang="en-US" dirty="0"/>
               <a:t> install mocha)</a:t>
             </a:r>
             <a:endParaRPr lang="sk-SK" dirty="0"/>
           </a:p>
           <a:p>
             <a:r>
-              <a:rPr lang="en-US" dirty="0" err="1" smtClean="0"/>
+              <a:rPr lang="en-US" dirty="0" err="1"/>
               <a:t>Zadanie</a:t>
             </a:r>
             <a:r>
-              <a:rPr lang="en-US" dirty="0" smtClean="0"/>
+              <a:rPr lang="en-US" dirty="0"/>
               <a:t>: exploratory testing</a:t>
             </a:r>
           </a:p>
           <a:p>
             <a:pPr lvl="1"/>
             <a:r>
-              <a:rPr lang="en-US" dirty="0" smtClean="0"/>
+              <a:rPr lang="en-US" dirty="0"/>
               <a:t>JS API (Array, String,….) – </a:t>
             </a:r>
             <a:r>
-              <a:rPr lang="en-US" dirty="0" err="1" smtClean="0"/>
+              <a:rPr lang="en-US" dirty="0" err="1"/>
               <a:t>za</a:t>
             </a:r>
             <a:r>
-              <a:rPr lang="sk-SK" dirty="0" smtClean="0"/>
-              <a:t>čiato</a:t>
-            </a:r>
-            <a:r>
               <a:rPr lang="sk-SK" dirty="0"/>
-              <a:t>č</a:t>
-            </a:r>
-            <a:r>
-              <a:rPr lang="sk-SK" dirty="0" smtClean="0"/>
-              <a:t>níci</a:t>
-            </a:r>
-            <a:endParaRPr lang="en-US" dirty="0" smtClean="0"/>
+              <a:t>čiatočníci</a:t>
+            </a:r>
+            <a:endParaRPr lang="en-US" dirty="0"/>
           </a:p>
           <a:p>
             <a:pPr lvl="1"/>
             <a:r>
-              <a:rPr lang="en-US" dirty="0" smtClean="0"/>
+              <a:rPr lang="en-US" dirty="0"/>
               <a:t>node fs module</a:t>
             </a:r>
             <a:r>
-              <a:rPr lang="sk-SK" dirty="0" smtClean="0"/>
+              <a:rPr lang="sk-SK" dirty="0"/>
               <a:t> - pokročilí</a:t>
             </a:r>
-            <a:endParaRPr lang="sk-SK" dirty="0"/>
           </a:p>
         </p:txBody>
       </p:sp>
@@ -4793,18 +4939,18 @@
               <a:buAutoNum type="alphaUcPeriod"/>
             </a:pPr>
             <a:r>
-              <a:rPr lang="en-US" dirty="0" err="1" smtClean="0"/>
+              <a:rPr lang="en-US" dirty="0" err="1"/>
               <a:t>manualne</a:t>
             </a:r>
             <a:r>
-              <a:rPr lang="en-US" dirty="0" smtClean="0"/>
-              <a:t> </a:t>
-            </a:r>
-            <a:r>
-              <a:rPr lang="en-US" dirty="0" err="1" smtClean="0"/>
+              <a:rPr lang="en-US" dirty="0"/>
+              <a:t> </a:t>
+            </a:r>
+            <a:r>
+              <a:rPr lang="en-US" dirty="0" err="1"/>
               <a:t>vytvorenie</a:t>
             </a:r>
-            <a:endParaRPr lang="en-US" dirty="0" smtClean="0"/>
+            <a:endParaRPr lang="en-US" dirty="0"/>
           </a:p>
           <a:p>
             <a:pPr marL="514350" indent="-514350">
@@ -4812,31 +4958,31 @@
               <a:buAutoNum type="alphaUcPeriod"/>
             </a:pPr>
             <a:r>
-              <a:rPr lang="en-US" dirty="0" err="1" smtClean="0"/>
+              <a:rPr lang="en-US" dirty="0" err="1"/>
               <a:t>nejaky</a:t>
             </a:r>
             <a:r>
-              <a:rPr lang="en-US" dirty="0" smtClean="0"/>
+              <a:rPr lang="en-US" dirty="0"/>
               <a:t> boilerplate (</a:t>
             </a:r>
             <a:r>
-              <a:rPr lang="en-US" dirty="0" err="1" smtClean="0"/>
+              <a:rPr lang="en-US" dirty="0" err="1"/>
               <a:t>minimalisticky</a:t>
             </a:r>
             <a:r>
-              <a:rPr lang="en-US" dirty="0" smtClean="0"/>
+              <a:rPr lang="en-US" dirty="0"/>
               <a:t>) </a:t>
             </a:r>
             <a:r>
-              <a:rPr lang="en-US" dirty="0" err="1" smtClean="0"/>
+              <a:rPr lang="en-US" dirty="0" err="1"/>
               <a:t>napriklad</a:t>
             </a:r>
             <a:r>
-              <a:rPr lang="en-US" dirty="0" smtClean="0"/>
-              <a:t> </a:t>
-            </a:r>
-            <a:r>
-              <a:rPr lang="en-US" dirty="0" err="1" smtClean="0"/>
+              <a:rPr lang="en-US" dirty="0"/>
+              <a:t> </a:t>
+            </a:r>
+            <a:r>
+              <a:rPr lang="en-US" dirty="0" err="1"/>
               <a:t>moj</a:t>
             </a:r>
             <a:r>
@@ -4847,15 +4993,9 @@
               <a:rPr lang="en-US" dirty="0">
                 <a:hlinkClick r:id="rId2"/>
               </a:rPr>
-              <a:t>https://</a:t>
-            </a:r>
-            <a:r>
-              <a:rPr lang="en-US" dirty="0" smtClean="0">
-                <a:hlinkClick r:id="rId2"/>
-              </a:rPr>
-              <a:t>github.com/ainthek/node-boilerplate/tree/cli-boilerplate</a:t>
-            </a:r>
-            <a:endParaRPr lang="en-US" dirty="0" smtClean="0"/>
+              <a:t>https://github.com/ainthek/node-boilerplate/tree/cli-boilerplate</a:t>
+            </a:r>
+            <a:endParaRPr lang="en-US" dirty="0"/>
           </a:p>
           <a:p>
             <a:pPr marL="514350" indent="-514350">
@@ -4863,27 +5003,27 @@
               <a:buAutoNum type="alphaUcPeriod"/>
             </a:pPr>
             <a:r>
-              <a:rPr lang="en-US" dirty="0" err="1" smtClean="0"/>
+              <a:rPr lang="en-US" dirty="0" err="1"/>
               <a:t>inak</a:t>
             </a:r>
             <a:r>
-              <a:rPr lang="en-US" dirty="0" smtClean="0"/>
+              <a:rPr lang="en-US" dirty="0"/>
               <a:t> ? mate </a:t>
             </a:r>
             <a:r>
-              <a:rPr lang="en-US" dirty="0" err="1" smtClean="0"/>
+              <a:rPr lang="en-US" dirty="0" err="1"/>
               <a:t>nejake</a:t>
             </a:r>
             <a:r>
-              <a:rPr lang="en-US" dirty="0" smtClean="0"/>
-              <a:t> </a:t>
-            </a:r>
-            <a:r>
-              <a:rPr lang="en-US" dirty="0" err="1" smtClean="0"/>
+              <a:rPr lang="en-US" dirty="0"/>
+              <a:t> </a:t>
+            </a:r>
+            <a:r>
+              <a:rPr lang="en-US" dirty="0" err="1"/>
               <a:t>napady</a:t>
             </a:r>
             <a:r>
-              <a:rPr lang="en-US" dirty="0" smtClean="0"/>
+              <a:rPr lang="en-US" dirty="0"/>
               <a:t> ?</a:t>
             </a:r>
             <a:endParaRPr lang="sk-SK" dirty="0"/>
@@ -4936,19 +5076,19 @@
           <a:lstStyle/>
           <a:p>
             <a:r>
-              <a:rPr lang="en-US" dirty="0" err="1" smtClean="0"/>
+              <a:rPr lang="en-US" dirty="0" err="1"/>
               <a:t>Zadanie</a:t>
             </a:r>
             <a:r>
-              <a:rPr lang="en-US" dirty="0" smtClean="0"/>
+              <a:rPr lang="en-US" dirty="0"/>
               <a:t> 2: </a:t>
             </a:r>
             <a:r>
-              <a:rPr lang="en-US" dirty="0" err="1" smtClean="0"/>
+              <a:rPr lang="en-US" dirty="0" err="1"/>
               <a:t>projekt</a:t>
             </a:r>
             <a:r>
-              <a:rPr lang="en-US" dirty="0" smtClean="0"/>
+              <a:rPr lang="en-US" dirty="0"/>
               <a:t> wawjs-cvicenie02</a:t>
             </a:r>
             <a:endParaRPr lang="sk-SK" dirty="0"/>
@@ -4979,15 +5119,9 @@
               <a:rPr lang="sk-SK" dirty="0">
                 <a:hlinkClick r:id="rId2"/>
               </a:rPr>
-              <a:t>https://github.com/ainthek/node-boilerplate</a:t>
-            </a:r>
-            <a:r>
-              <a:rPr lang="sk-SK" dirty="0" smtClean="0">
-                <a:hlinkClick r:id="rId2"/>
-              </a:rPr>
-              <a:t>/</a:t>
-            </a:r>
-            <a:endParaRPr lang="en-US" dirty="0" smtClean="0"/>
+              <a:t>https://github.com/ainthek/node-boilerplate/</a:t>
+            </a:r>
+            <a:endParaRPr lang="en-US" dirty="0"/>
           </a:p>
           <a:p>
             <a:pPr marL="0" indent="0">
@@ -5084,23 +5218,23 @@
           <a:lstStyle/>
           <a:p>
             <a:r>
-              <a:rPr lang="en-US" dirty="0" err="1" smtClean="0"/>
+              <a:rPr lang="en-US" dirty="0" err="1"/>
               <a:t>Vymente</a:t>
             </a:r>
             <a:r>
-              <a:rPr lang="en-US" dirty="0" smtClean="0"/>
-              <a:t> </a:t>
-            </a:r>
-            <a:r>
-              <a:rPr lang="en-US" dirty="0" err="1" smtClean="0"/>
+              <a:rPr lang="en-US" dirty="0"/>
+              <a:t> </a:t>
+            </a:r>
+            <a:r>
+              <a:rPr lang="en-US" dirty="0" err="1"/>
               <a:t>za</a:t>
             </a:r>
             <a:r>
-              <a:rPr lang="en-US" dirty="0" smtClean="0"/>
-              <a:t> </a:t>
-            </a:r>
-            <a:r>
-              <a:rPr lang="en-US" b="1" dirty="0" smtClean="0"/>
+              <a:rPr lang="en-US" dirty="0"/>
+              <a:t> </a:t>
+            </a:r>
+            <a:r>
+              <a:rPr lang="en-US" b="1" dirty="0"/>
               <a:t>wawjs-cvicenie02</a:t>
             </a:r>
             <a:endParaRPr lang="sk-SK" b="1" dirty="0"/>
@@ -5117,13 +5251,6 @@
   <p:clrMapOvr>
     <a:masterClrMapping/>
   </p:clrMapOvr>
-  <p:timing>
-    <p:tnLst>
-      <p:par>
-        <p:cTn id="1" dur="indefinite" restart="never" nodeType="tmRoot"/>
-      </p:par>
-    </p:tnLst>
-  </p:timing>
 </p:sld>
 </file>
 
@@ -5168,23 +5295,23 @@
               <a:t> 2: </a:t>
             </a:r>
             <a:r>
-              <a:rPr lang="en-US" dirty="0" err="1" smtClean="0"/>
+              <a:rPr lang="en-US" dirty="0" err="1"/>
               <a:t>struktura</a:t>
             </a:r>
             <a:r>
-              <a:rPr lang="en-US" dirty="0" smtClean="0"/>
-              <a:t> </a:t>
-            </a:r>
-            <a:r>
-              <a:rPr lang="en-US" dirty="0" err="1" smtClean="0"/>
+              <a:rPr lang="en-US" dirty="0"/>
+              <a:t> </a:t>
+            </a:r>
+            <a:r>
+              <a:rPr lang="en-US" dirty="0" err="1"/>
               <a:t>projektu</a:t>
             </a:r>
             <a:r>
-              <a:rPr lang="en-US" dirty="0" smtClean="0"/>
+              <a:rPr lang="en-US" dirty="0"/>
               <a:t> – </a:t>
             </a:r>
             <a:r>
-              <a:rPr lang="en-US" dirty="0" err="1" smtClean="0"/>
+              <a:rPr lang="en-US" dirty="0" err="1"/>
               <a:t>vysvetlenie</a:t>
             </a:r>
             <a:endParaRPr lang="sk-SK" dirty="0"/>
@@ -5485,13 +5612,6 @@
   <p:clrMapOvr>
     <a:masterClrMapping/>
   </p:clrMapOvr>
-  <p:timing>
-    <p:tnLst>
-      <p:par>
-        <p:cTn id="1" dur="indefinite" restart="never" nodeType="tmRoot"/>
-      </p:par>
-    </p:tnLst>
-  </p:timing>
 </p:sld>
 </file>
 
@@ -5517,7 +5637,7 @@
           <p:cNvPr id="2" name="Title 1">
             <a:extLst>
               <a:ext uri="{FF2B5EF4-FFF2-40B4-BE49-F238E27FC236}">
-                <a16:creationId xmlns:a16="http://schemas.microsoft.com/office/drawing/2014/main" xmlns="" id="{85A4320E-86AC-2E47-9FFF-AFA22BB9004F}"/>
+                <a16:creationId xmlns:a16="http://schemas.microsoft.com/office/drawing/2014/main" id="{85A4320E-86AC-2E47-9FFF-AFA22BB9004F}"/>
               </a:ext>
             </a:extLst>
           </p:cNvPr>
@@ -5534,18 +5654,17 @@
           <a:lstStyle/>
           <a:p>
             <a:r>
-              <a:rPr lang="en-US" dirty="0" err="1" smtClean="0"/>
+              <a:rPr lang="en-US" dirty="0" err="1"/>
               <a:t>Zadanie</a:t>
             </a:r>
             <a:r>
-              <a:rPr lang="en-US" dirty="0" smtClean="0"/>
+              <a:rPr lang="en-US" dirty="0"/>
               <a:t> 2: </a:t>
             </a:r>
             <a:r>
-              <a:rPr lang="sk-SK" dirty="0" smtClean="0"/>
+              <a:rPr lang="sk-SK" dirty="0"/>
               <a:t>Exploratory Testing</a:t>
             </a:r>
-            <a:endParaRPr lang="sk-SK" dirty="0"/>
           </a:p>
         </p:txBody>
       </p:sp>
@@ -5554,7 +5673,7 @@
           <p:cNvPr id="3" name="Content Placeholder 2">
             <a:extLst>
               <a:ext uri="{FF2B5EF4-FFF2-40B4-BE49-F238E27FC236}">
-                <a16:creationId xmlns:a16="http://schemas.microsoft.com/office/drawing/2014/main" xmlns="" id="{55A28041-9819-B449-9F00-B08DEE7B3D1E}"/>
+                <a16:creationId xmlns:a16="http://schemas.microsoft.com/office/drawing/2014/main" id="{55A28041-9819-B449-9F00-B08DEE7B3D1E}"/>
               </a:ext>
             </a:extLst>
           </p:cNvPr>
@@ -5573,282 +5692,467 @@
           <a:lstStyle/>
           <a:p>
             <a:r>
-              <a:rPr lang="en-US" dirty="0" smtClean="0"/>
-              <a:t>Exploratory </a:t>
-            </a:r>
-            <a:r>
-              <a:rPr lang="en-US" dirty="0"/>
-              <a:t>testing is an approach to software testing that is concisely described as </a:t>
-            </a:r>
-            <a:endParaRPr lang="sk-SK" dirty="0" smtClean="0"/>
+              <a:rPr lang="en-US" dirty="0"/>
+              <a:t>Exploratory testing is an approach to software testing that is concisely described as </a:t>
+            </a:r>
+            <a:endParaRPr lang="sk-SK" dirty="0"/>
           </a:p>
           <a:p>
             <a:pPr lvl="1"/>
             <a:r>
-              <a:rPr lang="en-US" b="1" dirty="0" smtClean="0"/>
-              <a:t>simultaneous </a:t>
-            </a:r>
-            <a:r>
               <a:rPr lang="en-US" b="1" dirty="0"/>
-              <a:t>learning</a:t>
+              <a:t>simultaneous learning</a:t>
             </a:r>
             <a:r>
               <a:rPr lang="en-US" dirty="0"/>
               <a:t>, </a:t>
             </a:r>
-            <a:endParaRPr lang="sk-SK" dirty="0" smtClean="0"/>
+            <a:endParaRPr lang="sk-SK" dirty="0"/>
           </a:p>
           <a:p>
             <a:pPr lvl="1"/>
             <a:r>
-              <a:rPr lang="en-US" dirty="0" smtClean="0"/>
-              <a:t>test </a:t>
-            </a:r>
-            <a:r>
-              <a:rPr lang="en-US" dirty="0"/>
-              <a:t>design and </a:t>
-            </a:r>
-            <a:endParaRPr lang="sk-SK" dirty="0" smtClean="0"/>
+              <a:rPr lang="en-US" dirty="0"/>
+              <a:t>test design and </a:t>
+            </a:r>
+            <a:endParaRPr lang="sk-SK" dirty="0"/>
           </a:p>
           <a:p>
             <a:pPr lvl="1"/>
             <a:r>
-              <a:rPr lang="en-US" dirty="0" smtClean="0"/>
+              <a:rPr lang="en-US" dirty="0"/>
               <a:t>test execution</a:t>
             </a:r>
           </a:p>
           <a:p>
             <a:r>
-              <a:rPr lang="en-US" b="1" dirty="0" smtClean="0"/>
+              <a:rPr lang="en-US" b="1" dirty="0"/>
               <a:t>Learning</a:t>
             </a:r>
             <a:r>
               <a:rPr lang="en-US" dirty="0"/>
+              <a:t>:  to co bolo </a:t>
+            </a:r>
+            <a:r>
+              <a:rPr lang="en-US" dirty="0" err="1"/>
+              <a:t>odprednasane</a:t>
+            </a:r>
+            <a:r>
+              <a:rPr lang="en-US" dirty="0"/>
+              <a:t> </a:t>
+            </a:r>
+            <a:r>
+              <a:rPr lang="en-US" dirty="0" err="1"/>
+              <a:t>na</a:t>
+            </a:r>
+            <a:r>
+              <a:rPr lang="en-US" dirty="0"/>
+              <a:t> </a:t>
+            </a:r>
+            <a:r>
+              <a:rPr lang="en-US" dirty="0" err="1"/>
+              <a:t>prednaske</a:t>
+            </a:r>
+            <a:r>
+              <a:rPr lang="en-US" dirty="0"/>
+              <a:t> 1 a 2, </a:t>
+            </a:r>
+            <a:r>
+              <a:rPr lang="en-US" dirty="0" err="1"/>
+              <a:t>prepisat</a:t>
+            </a:r>
+            <a:r>
+              <a:rPr lang="en-US" dirty="0"/>
+              <a:t> </a:t>
+            </a:r>
+            <a:r>
+              <a:rPr lang="en-US" dirty="0" err="1"/>
+              <a:t>nejake</a:t>
+            </a:r>
+            <a:r>
+              <a:rPr lang="en-US" dirty="0"/>
+              <a:t> samples z </a:t>
+            </a:r>
+            <a:r>
+              <a:rPr lang="en-US" dirty="0" err="1"/>
+              <a:t>prednasky</a:t>
+            </a:r>
+            <a:r>
+              <a:rPr lang="en-US" dirty="0"/>
+              <a:t> a </a:t>
+            </a:r>
+            <a:r>
+              <a:rPr lang="en-US" dirty="0" err="1"/>
+              <a:t>odskusat</a:t>
+            </a:r>
+            <a:r>
+              <a:rPr lang="en-US" dirty="0"/>
+              <a:t> </a:t>
+            </a:r>
+            <a:r>
+              <a:rPr lang="en-US" dirty="0" err="1"/>
+              <a:t>si</a:t>
+            </a:r>
+            <a:r>
+              <a:rPr lang="en-US" dirty="0"/>
+              <a:t> to </a:t>
+            </a:r>
+            <a:r>
+              <a:rPr lang="en-US" dirty="0" err="1"/>
+              <a:t>sami</a:t>
+            </a:r>
+            <a:r>
+              <a:rPr lang="en-US" dirty="0"/>
+              <a:t> (</a:t>
+            </a:r>
+            <a:r>
+              <a:rPr lang="en-US" dirty="0" err="1"/>
+              <a:t>funkcie</a:t>
+            </a:r>
+            <a:r>
+              <a:rPr lang="en-US" dirty="0"/>
+              <a:t>, </a:t>
+            </a:r>
+            <a:r>
+              <a:rPr lang="en-US" dirty="0" err="1"/>
+              <a:t>prototypy</a:t>
+            </a:r>
+            <a:r>
+              <a:rPr lang="en-US" dirty="0"/>
+              <a:t>, classes, JS API)</a:t>
+            </a:r>
+          </a:p>
+          <a:p>
+            <a:pPr lvl="1"/>
+            <a:r>
+              <a:rPr lang="en-US" dirty="0" err="1"/>
+              <a:t>ak</a:t>
+            </a:r>
+            <a:r>
+              <a:rPr lang="en-US" dirty="0"/>
+              <a:t> </a:t>
+            </a:r>
+            <a:r>
+              <a:rPr lang="en-US" dirty="0" err="1"/>
+              <a:t>nepoznate</a:t>
+            </a:r>
+            <a:r>
+              <a:rPr lang="en-US" dirty="0"/>
+              <a:t> JS </a:t>
+            </a:r>
+            <a:r>
+              <a:rPr lang="en-US" dirty="0" err="1"/>
+              <a:t>api</a:t>
+            </a:r>
+            <a:r>
+              <a:rPr lang="en-US" dirty="0"/>
+              <a:t>, </a:t>
+            </a:r>
+            <a:r>
+              <a:rPr lang="en-US" dirty="0" err="1"/>
+              <a:t>zacat</a:t>
+            </a:r>
+            <a:r>
+              <a:rPr lang="en-US" dirty="0"/>
+              <a:t> </a:t>
+            </a:r>
+            <a:r>
+              <a:rPr lang="en-US" dirty="0" err="1"/>
+              <a:t>citat</a:t>
+            </a:r>
+            <a:r>
+              <a:rPr lang="en-US" dirty="0"/>
+              <a:t> MDN k </a:t>
+            </a:r>
+            <a:r>
+              <a:rPr lang="en-US" dirty="0" err="1"/>
+              <a:t>danemu</a:t>
+            </a:r>
+            <a:r>
+              <a:rPr lang="en-US" dirty="0"/>
+              <a:t> API a </a:t>
+            </a:r>
+            <a:r>
+              <a:rPr lang="en-US" dirty="0" err="1"/>
+              <a:t>skusat</a:t>
+            </a:r>
+            <a:r>
+              <a:rPr lang="en-US" dirty="0"/>
+              <a:t> </a:t>
+            </a:r>
+            <a:r>
+              <a:rPr lang="en-US" dirty="0" err="1"/>
+              <a:t>si</a:t>
+            </a:r>
+            <a:r>
+              <a:rPr lang="en-US" dirty="0"/>
+              <a:t> </a:t>
+            </a:r>
+            <a:r>
+              <a:rPr lang="en-US" dirty="0" err="1"/>
+              <a:t>jednotlive</a:t>
+            </a:r>
+            <a:r>
+              <a:rPr lang="en-US" dirty="0"/>
+              <a:t> </a:t>
+            </a:r>
+            <a:r>
+              <a:rPr lang="en-US" dirty="0" err="1"/>
+              <a:t>metody</a:t>
+            </a:r>
+            <a:r>
+              <a:rPr lang="en-US" dirty="0"/>
+              <a:t> a border cases (v </a:t>
+            </a:r>
+            <a:r>
+              <a:rPr lang="en-US" dirty="0" err="1"/>
+              <a:t>podstate</a:t>
+            </a:r>
+            <a:r>
+              <a:rPr lang="en-US" dirty="0"/>
+              <a:t> </a:t>
+            </a:r>
+            <a:r>
+              <a:rPr lang="en-US" dirty="0" err="1"/>
+              <a:t>si</a:t>
+            </a:r>
+            <a:r>
+              <a:rPr lang="en-US" dirty="0"/>
+              <a:t> </a:t>
+            </a:r>
+            <a:r>
+              <a:rPr lang="en-US" dirty="0" err="1"/>
+              <a:t>vytvorit</a:t>
+            </a:r>
+            <a:r>
+              <a:rPr lang="en-US" dirty="0"/>
+              <a:t> </a:t>
+            </a:r>
+            <a:r>
+              <a:rPr lang="en-US" dirty="0" err="1"/>
+              <a:t>vlastne</a:t>
+            </a:r>
+            <a:r>
+              <a:rPr lang="en-US" dirty="0"/>
+              <a:t> samples </a:t>
+            </a:r>
+            <a:r>
+              <a:rPr lang="en-US" dirty="0" err="1"/>
+              <a:t>podobne</a:t>
+            </a:r>
+            <a:r>
+              <a:rPr lang="en-US" dirty="0"/>
+              <a:t> </a:t>
+            </a:r>
+            <a:r>
+              <a:rPr lang="en-US" dirty="0" err="1"/>
+              <a:t>ako</a:t>
+            </a:r>
+            <a:r>
+              <a:rPr lang="en-US" dirty="0"/>
+              <a:t> ma MDN)</a:t>
+            </a:r>
+          </a:p>
+          <a:p>
+            <a:pPr lvl="1"/>
+            <a:r>
+              <a:rPr lang="en-US" dirty="0" err="1"/>
+              <a:t>ak</a:t>
+            </a:r>
+            <a:r>
+              <a:rPr lang="en-US" dirty="0"/>
+              <a:t> </a:t>
+            </a:r>
+            <a:r>
+              <a:rPr lang="en-US" dirty="0" err="1"/>
+              <a:t>poznate</a:t>
+            </a:r>
+            <a:r>
+              <a:rPr lang="en-US" dirty="0"/>
+              <a:t> JS API </a:t>
+            </a:r>
+            <a:r>
+              <a:rPr lang="en-US" dirty="0" err="1"/>
+              <a:t>tak</a:t>
+            </a:r>
+            <a:r>
+              <a:rPr lang="en-US" dirty="0"/>
+              <a:t> </a:t>
+            </a:r>
+            <a:r>
+              <a:rPr lang="en-US" dirty="0" err="1"/>
+              <a:t>zacat</a:t>
+            </a:r>
+            <a:r>
+              <a:rPr lang="en-US" dirty="0"/>
+              <a:t> </a:t>
+            </a:r>
+            <a:r>
+              <a:rPr lang="en-US" dirty="0" err="1"/>
+              <a:t>studovat</a:t>
+            </a:r>
+            <a:r>
+              <a:rPr lang="en-US" dirty="0"/>
+              <a:t> node.js filesystem API (</a:t>
+            </a:r>
+            <a:r>
+              <a:rPr lang="en-US" dirty="0" err="1"/>
+              <a:t>zase</a:t>
+            </a:r>
+            <a:r>
+              <a:rPr lang="en-US" dirty="0"/>
+              <a:t> </a:t>
+            </a:r>
+            <a:r>
+              <a:rPr lang="en-US" dirty="0" err="1"/>
+              <a:t>prepis</a:t>
+            </a:r>
+            <a:r>
+              <a:rPr lang="en-US" dirty="0"/>
+              <a:t> node fs </a:t>
+            </a:r>
+            <a:r>
+              <a:rPr lang="en-US" dirty="0" err="1"/>
+              <a:t>prikladov</a:t>
+            </a:r>
+            <a:r>
+              <a:rPr lang="en-US" dirty="0"/>
+              <a:t>) a </a:t>
+            </a:r>
+            <a:r>
+              <a:rPr lang="en-US" dirty="0" err="1"/>
+              <a:t>skusat</a:t>
+            </a:r>
+            <a:r>
+              <a:rPr lang="en-US" dirty="0"/>
+              <a:t> </a:t>
+            </a:r>
+            <a:r>
+              <a:rPr lang="en-US" dirty="0" err="1"/>
+              <a:t>si</a:t>
+            </a:r>
+            <a:r>
+              <a:rPr lang="en-US" dirty="0"/>
+              <a:t> </a:t>
+            </a:r>
+            <a:r>
+              <a:rPr lang="en-US" dirty="0" err="1"/>
+              <a:t>zapisi</a:t>
+            </a:r>
+            <a:r>
+              <a:rPr lang="en-US" dirty="0"/>
+              <a:t> </a:t>
+            </a:r>
+            <a:r>
+              <a:rPr lang="en-US" dirty="0" err="1"/>
+              <a:t>citania</a:t>
+            </a:r>
+            <a:r>
+              <a:rPr lang="en-US" dirty="0"/>
+              <a:t> </a:t>
+            </a:r>
+            <a:r>
+              <a:rPr lang="en-US" dirty="0" err="1"/>
+              <a:t>zapisovania</a:t>
+            </a:r>
+            <a:r>
+              <a:rPr lang="en-US" dirty="0"/>
+              <a:t> </a:t>
+            </a:r>
+            <a:r>
+              <a:rPr lang="en-US" dirty="0" err="1"/>
+              <a:t>na</a:t>
+            </a:r>
+            <a:r>
+              <a:rPr lang="en-US" dirty="0"/>
+              <a:t> fs</a:t>
+            </a:r>
+          </a:p>
+          <a:p>
+            <a:r>
+              <a:rPr lang="en-US" b="1" dirty="0"/>
+              <a:t>Test design</a:t>
+            </a:r>
+            <a:r>
+              <a:rPr lang="en-US" dirty="0"/>
               <a:t>: </a:t>
             </a:r>
-            <a:r>
-              <a:rPr lang="en-US" dirty="0" smtClean="0"/>
+          </a:p>
+          <a:p>
+            <a:pPr lvl="1"/>
+            <a:r>
+              <a:rPr lang="en-US" dirty="0"/>
+              <a:t>plain </a:t>
+            </a:r>
+            <a:r>
+              <a:rPr lang="en-US" dirty="0" err="1"/>
+              <a:t>js</a:t>
+            </a:r>
+            <a:r>
+              <a:rPr lang="en-US" dirty="0"/>
+              <a:t> file z node assert library</a:t>
+            </a:r>
+          </a:p>
+          <a:p>
+            <a:pPr lvl="1"/>
+            <a:r>
+              <a:rPr lang="en-US" dirty="0" err="1"/>
+              <a:t>zakladna</a:t>
+            </a:r>
+            <a:r>
+              <a:rPr lang="en-US" dirty="0"/>
+              <a:t> </a:t>
+            </a:r>
+            <a:r>
+              <a:rPr lang="en-US" dirty="0" err="1"/>
+              <a:t>struktura</a:t>
+            </a:r>
+            <a:r>
+              <a:rPr lang="en-US" dirty="0"/>
+              <a:t> mocha BDD test suite z </a:t>
+            </a:r>
+            <a:r>
+              <a:rPr lang="en-US" dirty="0" err="1"/>
+              <a:t>zakladnymi</a:t>
+            </a:r>
+            <a:r>
+              <a:rPr lang="en-US" dirty="0"/>
+              <a:t> </a:t>
+            </a:r>
+            <a:r>
+              <a:rPr lang="en-US" b="1" dirty="0"/>
+              <a:t>node</a:t>
+            </a:r>
+            <a:r>
+              <a:rPr lang="en-US" dirty="0"/>
+              <a:t> </a:t>
+            </a:r>
+            <a:r>
+              <a:rPr lang="en-US" dirty="0" err="1"/>
+              <a:t>assertami</a:t>
+            </a:r>
+            <a:endParaRPr lang="en-US" dirty="0"/>
+          </a:p>
+          <a:p>
+            <a:r>
+              <a:rPr lang="en-US" b="1" dirty="0"/>
+              <a:t>Test execution</a:t>
+            </a:r>
+            <a:r>
+              <a:rPr lang="en-US" dirty="0"/>
+              <a:t>: </a:t>
+            </a:r>
+            <a:r>
+              <a:rPr lang="en-US" dirty="0" err="1"/>
+              <a:t>budeme</a:t>
+            </a:r>
+            <a:r>
+              <a:rPr lang="en-US" dirty="0"/>
               <a:t> to </a:t>
             </a:r>
             <a:r>
-              <a:rPr lang="en-US" dirty="0"/>
-              <a:t>co bolo </a:t>
-            </a:r>
-            <a:r>
-              <a:rPr lang="en-US" dirty="0" err="1"/>
-              <a:t>odprednasane</a:t>
-            </a:r>
-            <a:r>
-              <a:rPr lang="en-US" dirty="0"/>
-              <a:t> </a:t>
-            </a:r>
-            <a:r>
-              <a:rPr lang="en-US" dirty="0" err="1"/>
-              <a:t>na</a:t>
-            </a:r>
-            <a:r>
-              <a:rPr lang="en-US" dirty="0"/>
-              <a:t> </a:t>
-            </a:r>
-            <a:r>
-              <a:rPr lang="en-US" dirty="0" err="1"/>
-              <a:t>prednaske</a:t>
-            </a:r>
-            <a:r>
-              <a:rPr lang="en-US" dirty="0"/>
-              <a:t> 1 a 2, </a:t>
-            </a:r>
-            <a:r>
-              <a:rPr lang="en-US" dirty="0" err="1"/>
-              <a:t>prepisat</a:t>
-            </a:r>
-            <a:r>
-              <a:rPr lang="en-US" dirty="0"/>
-              <a:t> </a:t>
-            </a:r>
-            <a:r>
-              <a:rPr lang="en-US" dirty="0" err="1"/>
-              <a:t>nejake</a:t>
-            </a:r>
-            <a:r>
-              <a:rPr lang="en-US" dirty="0"/>
-              <a:t> samples z </a:t>
-            </a:r>
-            <a:r>
-              <a:rPr lang="en-US" dirty="0" err="1"/>
-              <a:t>prednasky</a:t>
-            </a:r>
-            <a:r>
-              <a:rPr lang="en-US" dirty="0"/>
-              <a:t> a </a:t>
-            </a:r>
-            <a:r>
-              <a:rPr lang="en-US" dirty="0" err="1"/>
-              <a:t>odskusat</a:t>
-            </a:r>
-            <a:r>
-              <a:rPr lang="en-US" dirty="0"/>
-              <a:t> </a:t>
-            </a:r>
-            <a:r>
-              <a:rPr lang="en-US" dirty="0" err="1"/>
-              <a:t>si</a:t>
-            </a:r>
-            <a:r>
-              <a:rPr lang="en-US" dirty="0"/>
-              <a:t> to </a:t>
-            </a:r>
-            <a:r>
-              <a:rPr lang="en-US" dirty="0" err="1" smtClean="0"/>
-              <a:t>sami</a:t>
-            </a:r>
-            <a:r>
-              <a:rPr lang="en-US" dirty="0" smtClean="0"/>
-              <a:t> (</a:t>
-            </a:r>
-            <a:r>
-              <a:rPr lang="en-US" dirty="0" err="1" smtClean="0"/>
-              <a:t>funkcie</a:t>
-            </a:r>
-            <a:r>
-              <a:rPr lang="en-US" dirty="0" smtClean="0"/>
-              <a:t>, </a:t>
-            </a:r>
-            <a:r>
-              <a:rPr lang="en-US" dirty="0" err="1" smtClean="0"/>
-              <a:t>prototypy</a:t>
-            </a:r>
-            <a:r>
-              <a:rPr lang="en-US" dirty="0" smtClean="0"/>
-              <a:t>, classes, JS API)</a:t>
-            </a:r>
-            <a:endParaRPr lang="en-US" dirty="0"/>
-          </a:p>
-          <a:p>
-            <a:pPr lvl="1"/>
-            <a:r>
-              <a:rPr lang="en-US" dirty="0" err="1"/>
-              <a:t>ak</a:t>
-            </a:r>
-            <a:r>
-              <a:rPr lang="en-US" dirty="0"/>
-              <a:t> </a:t>
-            </a:r>
-            <a:r>
-              <a:rPr lang="en-US" dirty="0" err="1"/>
-              <a:t>nepoznate</a:t>
-            </a:r>
-            <a:r>
-              <a:rPr lang="en-US" dirty="0"/>
-              <a:t> </a:t>
-            </a:r>
-            <a:r>
-              <a:rPr lang="en-US" dirty="0" smtClean="0"/>
-              <a:t>JS </a:t>
-            </a:r>
-            <a:r>
-              <a:rPr lang="en-US" dirty="0" err="1"/>
-              <a:t>api</a:t>
-            </a:r>
-            <a:r>
-              <a:rPr lang="en-US" dirty="0"/>
-              <a:t>, </a:t>
-            </a:r>
-            <a:r>
-              <a:rPr lang="en-US" dirty="0" err="1" smtClean="0"/>
-              <a:t>zacat</a:t>
-            </a:r>
-            <a:r>
-              <a:rPr lang="en-US" dirty="0" smtClean="0"/>
-              <a:t> </a:t>
-            </a:r>
-            <a:r>
-              <a:rPr lang="en-US" dirty="0" err="1" smtClean="0"/>
-              <a:t>citat</a:t>
-            </a:r>
-            <a:r>
-              <a:rPr lang="en-US" dirty="0" smtClean="0"/>
-              <a:t> </a:t>
-            </a:r>
-            <a:r>
-              <a:rPr lang="en-US" dirty="0"/>
-              <a:t>MDN k </a:t>
-            </a:r>
-            <a:r>
-              <a:rPr lang="en-US" dirty="0" err="1"/>
-              <a:t>danemu</a:t>
-            </a:r>
-            <a:r>
-              <a:rPr lang="en-US" dirty="0"/>
-              <a:t> API a </a:t>
-            </a:r>
-            <a:r>
-              <a:rPr lang="en-US" dirty="0" err="1"/>
-              <a:t>skusat</a:t>
-            </a:r>
-            <a:r>
-              <a:rPr lang="en-US" dirty="0"/>
-              <a:t> </a:t>
-            </a:r>
-            <a:r>
-              <a:rPr lang="en-US" dirty="0" err="1"/>
-              <a:t>si</a:t>
-            </a:r>
-            <a:r>
-              <a:rPr lang="en-US" dirty="0"/>
-              <a:t> </a:t>
-            </a:r>
-            <a:r>
-              <a:rPr lang="en-US" dirty="0" err="1"/>
-              <a:t>jednotlive</a:t>
-            </a:r>
-            <a:r>
-              <a:rPr lang="en-US" dirty="0"/>
-              <a:t> </a:t>
-            </a:r>
-            <a:r>
-              <a:rPr lang="en-US" dirty="0" err="1"/>
-              <a:t>metody</a:t>
-            </a:r>
-            <a:r>
-              <a:rPr lang="en-US" dirty="0"/>
-              <a:t> a border cases (v </a:t>
-            </a:r>
-            <a:r>
-              <a:rPr lang="en-US" dirty="0" err="1"/>
-              <a:t>podstate</a:t>
-            </a:r>
-            <a:r>
-              <a:rPr lang="en-US" dirty="0"/>
-              <a:t> </a:t>
-            </a:r>
-            <a:r>
-              <a:rPr lang="en-US" dirty="0" err="1"/>
-              <a:t>si</a:t>
-            </a:r>
-            <a:r>
-              <a:rPr lang="en-US" dirty="0"/>
-              <a:t> </a:t>
-            </a:r>
-            <a:r>
-              <a:rPr lang="en-US" dirty="0" err="1"/>
-              <a:t>vytvorit</a:t>
-            </a:r>
-            <a:r>
-              <a:rPr lang="en-US" dirty="0"/>
-              <a:t> </a:t>
-            </a:r>
-            <a:r>
-              <a:rPr lang="en-US" dirty="0" err="1"/>
-              <a:t>vlastne</a:t>
-            </a:r>
-            <a:r>
-              <a:rPr lang="en-US" dirty="0"/>
-              <a:t> samples </a:t>
-            </a:r>
-            <a:r>
-              <a:rPr lang="en-US" dirty="0" err="1"/>
-              <a:t>podobne</a:t>
+              <a:rPr lang="en-US" dirty="0" err="1"/>
+              <a:t>robit</a:t>
             </a:r>
             <a:r>
               <a:rPr lang="en-US" dirty="0"/>
@@ -5860,244 +6164,30 @@
             </a:r>
             <a:r>
               <a:rPr lang="en-US" dirty="0"/>
-              <a:t> ma MDN)</a:t>
-            </a:r>
-          </a:p>
-          <a:p>
-            <a:pPr lvl="1"/>
-            <a:r>
-              <a:rPr lang="en-US" dirty="0" err="1"/>
-              <a:t>ak</a:t>
-            </a:r>
-            <a:r>
-              <a:rPr lang="en-US" dirty="0"/>
-              <a:t> </a:t>
-            </a:r>
-            <a:r>
-              <a:rPr lang="en-US" dirty="0" err="1"/>
-              <a:t>poznate</a:t>
-            </a:r>
-            <a:r>
-              <a:rPr lang="en-US" dirty="0"/>
-              <a:t> JS API </a:t>
-            </a:r>
-            <a:r>
-              <a:rPr lang="en-US" dirty="0" err="1"/>
-              <a:t>tak</a:t>
-            </a:r>
-            <a:r>
-              <a:rPr lang="en-US" dirty="0"/>
-              <a:t> </a:t>
-            </a:r>
-            <a:r>
-              <a:rPr lang="en-US" dirty="0" err="1"/>
-              <a:t>zacat</a:t>
-            </a:r>
-            <a:r>
-              <a:rPr lang="en-US" dirty="0"/>
-              <a:t> </a:t>
-            </a:r>
-            <a:r>
-              <a:rPr lang="en-US" dirty="0" err="1"/>
-              <a:t>studovat</a:t>
-            </a:r>
-            <a:r>
-              <a:rPr lang="en-US" dirty="0"/>
-              <a:t> node.js filesystem API (</a:t>
-            </a:r>
-            <a:r>
-              <a:rPr lang="en-US" dirty="0" err="1"/>
-              <a:t>zase</a:t>
-            </a:r>
-            <a:r>
-              <a:rPr lang="en-US" dirty="0"/>
-              <a:t> </a:t>
-            </a:r>
-            <a:r>
-              <a:rPr lang="en-US" dirty="0" err="1" smtClean="0"/>
-              <a:t>prepis</a:t>
-            </a:r>
-            <a:r>
-              <a:rPr lang="en-US" dirty="0" smtClean="0"/>
-              <a:t> node fs </a:t>
-            </a:r>
-            <a:r>
-              <a:rPr lang="en-US" dirty="0" err="1" smtClean="0"/>
-              <a:t>prikladov</a:t>
-            </a:r>
-            <a:r>
-              <a:rPr lang="en-US" dirty="0" smtClean="0"/>
-              <a:t>) a </a:t>
-            </a:r>
-            <a:r>
-              <a:rPr lang="en-US" dirty="0" err="1" smtClean="0"/>
-              <a:t>skusat</a:t>
-            </a:r>
-            <a:r>
-              <a:rPr lang="en-US" dirty="0" smtClean="0"/>
-              <a:t> </a:t>
-            </a:r>
-            <a:r>
-              <a:rPr lang="en-US" dirty="0" err="1" smtClean="0"/>
-              <a:t>si</a:t>
-            </a:r>
-            <a:r>
-              <a:rPr lang="en-US" dirty="0" smtClean="0"/>
-              <a:t> </a:t>
-            </a:r>
-            <a:r>
-              <a:rPr lang="en-US" dirty="0" err="1" smtClean="0"/>
-              <a:t>zapisi</a:t>
-            </a:r>
-            <a:r>
-              <a:rPr lang="en-US" dirty="0" smtClean="0"/>
-              <a:t> </a:t>
-            </a:r>
-            <a:r>
-              <a:rPr lang="en-US" dirty="0" err="1" smtClean="0"/>
-              <a:t>citania</a:t>
-            </a:r>
-            <a:r>
-              <a:rPr lang="en-US" dirty="0" smtClean="0"/>
-              <a:t> </a:t>
-            </a:r>
-            <a:r>
-              <a:rPr lang="en-US" dirty="0" err="1" smtClean="0"/>
-              <a:t>zapisovania</a:t>
-            </a:r>
-            <a:r>
-              <a:rPr lang="en-US" dirty="0" smtClean="0"/>
-              <a:t> </a:t>
-            </a:r>
-            <a:r>
-              <a:rPr lang="en-US" dirty="0" err="1" smtClean="0"/>
-              <a:t>na</a:t>
-            </a:r>
-            <a:r>
-              <a:rPr lang="en-US" dirty="0" smtClean="0"/>
-              <a:t> fs</a:t>
-            </a:r>
-          </a:p>
-          <a:p>
-            <a:r>
-              <a:rPr lang="en-US" b="1" dirty="0" smtClean="0"/>
-              <a:t>Test design</a:t>
-            </a:r>
-            <a:r>
-              <a:rPr lang="en-US" dirty="0" smtClean="0"/>
-              <a:t>: </a:t>
-            </a:r>
-          </a:p>
-          <a:p>
-            <a:pPr lvl="1"/>
-            <a:r>
-              <a:rPr lang="en-US" dirty="0" smtClean="0"/>
-              <a:t>plain </a:t>
-            </a:r>
-            <a:r>
-              <a:rPr lang="en-US" dirty="0" err="1" smtClean="0"/>
-              <a:t>js</a:t>
-            </a:r>
-            <a:r>
-              <a:rPr lang="en-US" dirty="0" smtClean="0"/>
-              <a:t> file z node assert library</a:t>
-            </a:r>
-          </a:p>
-          <a:p>
-            <a:pPr lvl="1"/>
-            <a:r>
-              <a:rPr lang="en-US" dirty="0" err="1" smtClean="0"/>
-              <a:t>zakladna</a:t>
-            </a:r>
-            <a:r>
-              <a:rPr lang="en-US" dirty="0" smtClean="0"/>
-              <a:t> </a:t>
-            </a:r>
-            <a:r>
-              <a:rPr lang="en-US" dirty="0" err="1" smtClean="0"/>
-              <a:t>struktura</a:t>
-            </a:r>
-            <a:r>
-              <a:rPr lang="en-US" dirty="0" smtClean="0"/>
-              <a:t> mocha BDD test suite z </a:t>
-            </a:r>
-            <a:r>
-              <a:rPr lang="en-US" dirty="0" err="1" smtClean="0"/>
-              <a:t>zakladnymi</a:t>
-            </a:r>
-            <a:r>
-              <a:rPr lang="en-US" dirty="0" smtClean="0"/>
-              <a:t> </a:t>
-            </a:r>
-            <a:r>
-              <a:rPr lang="en-US" b="1" dirty="0" smtClean="0"/>
-              <a:t>node</a:t>
-            </a:r>
-            <a:r>
-              <a:rPr lang="en-US" dirty="0" smtClean="0"/>
-              <a:t> </a:t>
-            </a:r>
-            <a:r>
-              <a:rPr lang="en-US" dirty="0" err="1" smtClean="0"/>
-              <a:t>assertami</a:t>
-            </a:r>
-            <a:endParaRPr lang="en-US" dirty="0" smtClean="0"/>
-          </a:p>
-          <a:p>
-            <a:r>
-              <a:rPr lang="en-US" b="1" dirty="0" smtClean="0"/>
-              <a:t>Test execution</a:t>
-            </a:r>
-            <a:r>
-              <a:rPr lang="en-US" dirty="0" smtClean="0"/>
-              <a:t>: </a:t>
-            </a:r>
-            <a:r>
-              <a:rPr lang="en-US" dirty="0" err="1" smtClean="0"/>
-              <a:t>budeme</a:t>
-            </a:r>
-            <a:r>
-              <a:rPr lang="en-US" dirty="0" smtClean="0"/>
-              <a:t> to </a:t>
-            </a:r>
-            <a:r>
-              <a:rPr lang="en-US" dirty="0" err="1" smtClean="0"/>
-              <a:t>robit</a:t>
-            </a:r>
-            <a:r>
-              <a:rPr lang="en-US" dirty="0" smtClean="0"/>
-              <a:t> </a:t>
-            </a:r>
-            <a:r>
-              <a:rPr lang="en-US" dirty="0" err="1" smtClean="0"/>
-              <a:t>ako</a:t>
-            </a:r>
-            <a:r>
-              <a:rPr lang="en-US" dirty="0" smtClean="0"/>
               <a:t> node </a:t>
             </a:r>
             <a:r>
-              <a:rPr lang="en-US" dirty="0" err="1" smtClean="0"/>
+              <a:rPr lang="en-US" dirty="0" err="1"/>
               <a:t>projektik</a:t>
             </a:r>
             <a:r>
-              <a:rPr lang="en-US" dirty="0" smtClean="0"/>
-              <a:t> </a:t>
-            </a:r>
-            <a:r>
-              <a:rPr lang="en-US" dirty="0" err="1" smtClean="0"/>
+              <a:rPr lang="en-US" dirty="0"/>
+              <a:t> </a:t>
+            </a:r>
+            <a:r>
+              <a:rPr lang="en-US" dirty="0" err="1"/>
               <a:t>takze</a:t>
             </a:r>
             <a:r>
-              <a:rPr lang="en-US" dirty="0" smtClean="0"/>
-              <a:t> </a:t>
-            </a:r>
-            <a:r>
-              <a:rPr lang="en-US" b="1" dirty="0" err="1" smtClean="0"/>
+              <a:rPr lang="en-US" dirty="0"/>
+              <a:t> </a:t>
+            </a:r>
+            <a:r>
+              <a:rPr lang="en-US" b="1" dirty="0" err="1"/>
               <a:t>npm</a:t>
             </a:r>
             <a:r>
-              <a:rPr lang="en-US" b="1" dirty="0" smtClean="0"/>
+              <a:rPr lang="en-US" b="1" dirty="0"/>
               <a:t> test a mocha</a:t>
             </a:r>
             <a:endParaRPr lang="en-US" dirty="0"/>
@@ -6117,13 +6207,6 @@
   <p:clrMapOvr>
     <a:masterClrMapping/>
   </p:clrMapOvr>
-  <p:timing>
-    <p:tnLst>
-      <p:par>
-        <p:cTn id="1" dur="indefinite" restart="never" nodeType="tmRoot"/>
-      </p:par>
-    </p:tnLst>
-  </p:timing>
 </p:sld>
 </file>
 
@@ -6190,15 +6273,15 @@
           <a:lstStyle/>
           <a:p>
             <a:r>
-              <a:rPr lang="en-US" dirty="0" smtClean="0"/>
+              <a:rPr lang="en-US" dirty="0"/>
               <a:t>==,===,</a:t>
             </a:r>
             <a:r>
-              <a:rPr lang="en-US" dirty="0" err="1" smtClean="0"/>
-              <a:t>SameValueZeto</a:t>
-            </a:r>
-            <a:r>
-              <a:rPr lang="en-US" dirty="0" smtClean="0"/>
+              <a:rPr lang="en-US" dirty="0" err="1"/>
+              <a:t>SameValueZero</a:t>
+            </a:r>
+            <a:r>
+              <a:rPr lang="en-US" dirty="0"/>
               <a:t> vs assert.* function</a:t>
             </a:r>
           </a:p>
@@ -6211,130 +6294,124 @@
               <a:rPr lang="en-US" dirty="0">
                 <a:hlinkClick r:id="rId2"/>
               </a:rPr>
-              <a:t>https://</a:t>
-            </a:r>
-            <a:r>
-              <a:rPr lang="en-US" dirty="0" smtClean="0">
-                <a:hlinkClick r:id="rId2"/>
-              </a:rPr>
-              <a:t>nodejs.org/api/assert.html#assert_assert_strictequal_actual_expected_message</a:t>
-            </a:r>
-            <a:endParaRPr lang="en-US" dirty="0" smtClean="0"/>
-          </a:p>
-          <a:p>
-            <a:r>
-              <a:rPr lang="en-US" dirty="0" smtClean="0"/>
+              <a:t>https://nodejs.org/api/assert.html#assert_assert_strictequal_actual_expected_message</a:t>
+            </a:r>
+            <a:endParaRPr lang="en-US" dirty="0"/>
+          </a:p>
+          <a:p>
+            <a:r>
+              <a:rPr lang="en-US" dirty="0"/>
               <a:t>Toto je </a:t>
             </a:r>
             <a:r>
-              <a:rPr lang="en-US" dirty="0" err="1" smtClean="0"/>
+              <a:rPr lang="en-US" dirty="0" err="1"/>
               <a:t>dolezite</a:t>
             </a:r>
             <a:r>
-              <a:rPr lang="en-US" dirty="0" smtClean="0"/>
-              <a:t> </a:t>
-            </a:r>
-            <a:r>
-              <a:rPr lang="en-US" dirty="0" err="1" smtClean="0"/>
+              <a:rPr lang="en-US" dirty="0"/>
+              <a:t> </a:t>
+            </a:r>
+            <a:r>
+              <a:rPr lang="en-US" dirty="0" err="1"/>
               <a:t>pri</a:t>
             </a:r>
             <a:r>
-              <a:rPr lang="en-US" dirty="0" smtClean="0"/>
-              <a:t> </a:t>
-            </a:r>
-            <a:r>
-              <a:rPr lang="en-US" dirty="0" err="1" smtClean="0"/>
+              <a:rPr lang="en-US" dirty="0"/>
+              <a:t> </a:t>
+            </a:r>
+            <a:r>
+              <a:rPr lang="en-US" dirty="0" err="1"/>
               <a:t>pouzivani</a:t>
             </a:r>
             <a:r>
-              <a:rPr lang="en-US" dirty="0" smtClean="0"/>
-              <a:t> </a:t>
-            </a:r>
-            <a:r>
-              <a:rPr lang="en-US" dirty="0" err="1" smtClean="0"/>
+              <a:rPr lang="en-US" dirty="0"/>
+              <a:t> </a:t>
+            </a:r>
+            <a:r>
+              <a:rPr lang="en-US" dirty="0" err="1"/>
               <a:t>kazdej</a:t>
             </a:r>
             <a:r>
-              <a:rPr lang="en-US" dirty="0" smtClean="0"/>
+              <a:rPr lang="en-US" dirty="0"/>
               <a:t> assert library, </a:t>
             </a:r>
             <a:r>
-              <a:rPr lang="en-US" dirty="0" err="1" smtClean="0"/>
+              <a:rPr lang="en-US" dirty="0" err="1"/>
               <a:t>vediet</a:t>
             </a:r>
             <a:r>
-              <a:rPr lang="en-US" dirty="0" smtClean="0"/>
+              <a:rPr lang="en-US" dirty="0"/>
               <a:t> PRESNE </a:t>
             </a:r>
             <a:r>
-              <a:rPr lang="en-US" dirty="0" err="1" smtClean="0"/>
+              <a:rPr lang="en-US" dirty="0" err="1"/>
               <a:t>ako</a:t>
             </a:r>
             <a:r>
-              <a:rPr lang="en-US" dirty="0" smtClean="0"/>
-              <a:t> </a:t>
-            </a:r>
-            <a:r>
-              <a:rPr lang="en-US" dirty="0" err="1" smtClean="0"/>
+              <a:rPr lang="en-US" dirty="0"/>
+              <a:t> </a:t>
+            </a:r>
+            <a:r>
+              <a:rPr lang="en-US" dirty="0" err="1"/>
               <a:t>porovnava</a:t>
             </a:r>
             <a:endParaRPr lang="en-US" dirty="0"/>
           </a:p>
           <a:p>
             <a:r>
-              <a:rPr lang="en-US" dirty="0" err="1" smtClean="0"/>
+              <a:rPr lang="en-US" dirty="0" err="1"/>
               <a:t>napriklad</a:t>
             </a:r>
             <a:r>
-              <a:rPr lang="en-US" dirty="0" smtClean="0"/>
-              <a:t> </a:t>
-            </a:r>
-            <a:r>
-              <a:rPr lang="en-US" dirty="0" err="1" smtClean="0"/>
+              <a:rPr lang="en-US" dirty="0"/>
+              <a:t> </a:t>
+            </a:r>
+            <a:r>
+              <a:rPr lang="en-US" dirty="0" err="1"/>
               <a:t>ak</a:t>
             </a:r>
             <a:r>
-              <a:rPr lang="en-US" dirty="0" smtClean="0"/>
-              <a:t> </a:t>
-            </a:r>
-            <a:r>
-              <a:rPr lang="en-US" dirty="0" err="1" smtClean="0"/>
+              <a:rPr lang="en-US" dirty="0"/>
+              <a:t> </a:t>
+            </a:r>
+            <a:r>
+              <a:rPr lang="en-US" dirty="0" err="1"/>
               <a:t>napisem</a:t>
             </a:r>
             <a:r>
-              <a:rPr lang="en-US" dirty="0" smtClean="0"/>
-              <a:t> </a:t>
-            </a:r>
-            <a:r>
-              <a:rPr lang="en-US" dirty="0" err="1" smtClean="0"/>
+              <a:rPr lang="en-US" dirty="0"/>
+              <a:t> </a:t>
+            </a:r>
+            <a:r>
+              <a:rPr lang="en-US" dirty="0" err="1"/>
               <a:t>assert.strictEqual</a:t>
             </a:r>
             <a:r>
-              <a:rPr lang="en-US" dirty="0" smtClean="0"/>
+              <a:rPr lang="en-US" dirty="0"/>
               <a:t>(</a:t>
             </a:r>
             <a:r>
-              <a:rPr lang="en-US" dirty="0" err="1" smtClean="0"/>
+              <a:rPr lang="en-US" dirty="0" err="1"/>
               <a:t>x,y</a:t>
             </a:r>
             <a:r>
-              <a:rPr lang="en-US" dirty="0" smtClean="0"/>
+              <a:rPr lang="en-US" dirty="0"/>
               <a:t>) je to x===y </a:t>
             </a:r>
             <a:r>
-              <a:rPr lang="en-US" dirty="0" err="1" smtClean="0"/>
+              <a:rPr lang="en-US" dirty="0" err="1"/>
               <a:t>alebo</a:t>
             </a:r>
             <a:r>
-              <a:rPr lang="en-US" dirty="0" smtClean="0"/>
+              <a:rPr lang="en-US" dirty="0"/>
               <a:t> Object.is(</a:t>
             </a:r>
             <a:r>
-              <a:rPr lang="en-US" dirty="0" err="1" smtClean="0"/>
+              <a:rPr lang="en-US" dirty="0" err="1"/>
               <a:t>x,y</a:t>
             </a:r>
             <a:r>
-              <a:rPr lang="en-US" dirty="0" smtClean="0"/>
+              <a:rPr lang="en-US" dirty="0"/>
               <a:t>) ?</a:t>
             </a:r>
             <a:endParaRPr lang="sk-SK" dirty="0"/>
@@ -6387,11 +6464,11 @@
           <a:lstStyle/>
           <a:p>
             <a:r>
-              <a:rPr lang="en-US" dirty="0" smtClean="0"/>
-              <a:t>Exploratory testing - </a:t>
-            </a:r>
-            <a:r>
-              <a:rPr lang="en-US" dirty="0" err="1" smtClean="0"/>
+              <a:rPr lang="en-US" dirty="0"/>
+              <a:t>Exploratory testing – equality </a:t>
+            </a:r>
+            <a:r>
+              <a:rPr lang="en-US" dirty="0" err="1"/>
               <a:t>priklad</a:t>
             </a:r>
             <a:endParaRPr lang="sk-SK" dirty="0"/>
@@ -6419,79 +6496,79 @@
           <a:lstStyle/>
           <a:p>
             <a:r>
-              <a:rPr lang="en-US" dirty="0" smtClean="0"/>
+              <a:rPr lang="en-US" dirty="0"/>
               <a:t>Na </a:t>
             </a:r>
             <a:r>
-              <a:rPr lang="en-US" dirty="0" err="1" smtClean="0"/>
+              <a:rPr lang="en-US" dirty="0" err="1"/>
               <a:t>prednaske</a:t>
             </a:r>
             <a:r>
-              <a:rPr lang="en-US" dirty="0" smtClean="0"/>
-              <a:t> </a:t>
-            </a:r>
-            <a:r>
-              <a:rPr lang="en-US" dirty="0" err="1" smtClean="0"/>
+              <a:rPr lang="en-US" dirty="0"/>
+              <a:t> </a:t>
+            </a:r>
+            <a:r>
+              <a:rPr lang="en-US" dirty="0" err="1"/>
               <a:t>som</a:t>
             </a:r>
             <a:r>
-              <a:rPr lang="en-US" dirty="0" smtClean="0"/>
-              <a:t> </a:t>
-            </a:r>
-            <a:r>
-              <a:rPr lang="en-US" dirty="0" err="1" smtClean="0"/>
+              <a:rPr lang="en-US" dirty="0"/>
+              <a:t> </a:t>
+            </a:r>
+            <a:r>
+              <a:rPr lang="en-US" dirty="0" err="1"/>
               <a:t>nepochopil</a:t>
             </a:r>
             <a:r>
-              <a:rPr lang="en-US" dirty="0" smtClean="0"/>
-              <a:t> </a:t>
-            </a:r>
-            <a:r>
-              <a:rPr lang="en-US" dirty="0" err="1" smtClean="0"/>
+              <a:rPr lang="en-US" dirty="0"/>
+              <a:t> </a:t>
+            </a:r>
+            <a:r>
+              <a:rPr lang="en-US" dirty="0" err="1"/>
               <a:t>celkom</a:t>
             </a:r>
             <a:r>
-              <a:rPr lang="en-US" dirty="0" smtClean="0"/>
+              <a:rPr lang="en-US" dirty="0"/>
               <a:t> ==,===,</a:t>
             </a:r>
             <a:r>
-              <a:rPr lang="en-US" dirty="0" err="1" smtClean="0"/>
+              <a:rPr lang="en-US" dirty="0" err="1"/>
               <a:t>SameValue,SameValueZero</a:t>
             </a:r>
             <a:r>
-              <a:rPr lang="en-US" dirty="0" smtClean="0"/>
+              <a:rPr lang="en-US" dirty="0"/>
               <a:t>, </a:t>
             </a:r>
             <a:r>
-              <a:rPr lang="en-US" dirty="0" err="1" smtClean="0"/>
+              <a:rPr lang="en-US" dirty="0" err="1"/>
               <a:t>tak</a:t>
             </a:r>
             <a:r>
-              <a:rPr lang="en-US" dirty="0" smtClean="0"/>
-              <a:t> </a:t>
-            </a:r>
-            <a:r>
-              <a:rPr lang="en-US" dirty="0" err="1" smtClean="0"/>
+              <a:rPr lang="en-US" dirty="0"/>
+              <a:t> </a:t>
+            </a:r>
+            <a:r>
+              <a:rPr lang="en-US" dirty="0" err="1"/>
               <a:t>si</a:t>
             </a:r>
             <a:r>
-              <a:rPr lang="en-US" dirty="0" smtClean="0"/>
+              <a:rPr lang="en-US" dirty="0"/>
               <a:t> to </a:t>
             </a:r>
             <a:r>
-              <a:rPr lang="en-US" dirty="0" err="1" smtClean="0"/>
+              <a:rPr lang="en-US" dirty="0" err="1"/>
               <a:t>cjcem</a:t>
             </a:r>
             <a:r>
-              <a:rPr lang="en-US" dirty="0" smtClean="0"/>
-              <a:t> </a:t>
-            </a:r>
-            <a:r>
-              <a:rPr lang="en-US" dirty="0" err="1" smtClean="0"/>
+              <a:rPr lang="en-US" dirty="0"/>
+              <a:t> </a:t>
+            </a:r>
+            <a:r>
+              <a:rPr lang="en-US" dirty="0" err="1"/>
               <a:t>odskusat</a:t>
             </a:r>
             <a:r>
-              <a:rPr lang="en-US" dirty="0" smtClean="0"/>
+              <a:rPr lang="en-US" dirty="0"/>
               <a:t>…</a:t>
             </a:r>
             <a:endParaRPr lang="sk-SK" dirty="0"/>

</xml_diff>